<commit_message>
Razvijam backend za kontrole za posebne kretnje.
</commit_message>
<xml_diff>
--- a/docs/Zmijica.pptx
+++ b/docs/Zmijica.pptx
@@ -13,11 +13,13 @@
     <p:sldId id="257" r:id="rId7"/>
     <p:sldId id="258" r:id="rId8"/>
     <p:sldId id="268" r:id="rId9"/>
-    <p:sldId id="259" r:id="rId10"/>
-    <p:sldId id="263" r:id="rId11"/>
-    <p:sldId id="260" r:id="rId12"/>
-    <p:sldId id="261" r:id="rId13"/>
-    <p:sldId id="262" r:id="rId14"/>
+    <p:sldId id="269" r:id="rId10"/>
+    <p:sldId id="270" r:id="rId11"/>
+    <p:sldId id="259" r:id="rId12"/>
+    <p:sldId id="263" r:id="rId13"/>
+    <p:sldId id="260" r:id="rId14"/>
+    <p:sldId id="261" r:id="rId15"/>
+    <p:sldId id="262" r:id="rId16"/>
   </p:sldIdLst>
   <p:sldSz cx="12192000" cy="6858000"/>
   <p:notesSz cx="6858000" cy="9144000"/>
@@ -3426,7 +3428,7 @@
           <p:cNvPr id="2" name="Title 1">
             <a:extLst>
               <a:ext uri="{FF2B5EF4-FFF2-40B4-BE49-F238E27FC236}">
-                <a16:creationId xmlns:a16="http://schemas.microsoft.com/office/drawing/2014/main" id="{568FAC47-4F40-576E-683E-84D1683EE49E}"/>
+                <a16:creationId xmlns:a16="http://schemas.microsoft.com/office/drawing/2014/main" id="{2F9A3067-A73C-B706-5A15-577B7589345A}"/>
               </a:ext>
             </a:extLst>
           </p:cNvPr>
@@ -3444,7 +3446,7 @@
           <a:p>
             <a:r>
               <a:rPr lang="hr-HR" dirty="0"/>
-              <a:t>Varijable</a:t>
+              <a:t>GameForm.GetScreen</a:t>
             </a:r>
             <a:endParaRPr lang="en-US" dirty="0"/>
           </a:p>
@@ -3455,7 +3457,7 @@
           <p:cNvPr id="3" name="Content Placeholder 2">
             <a:extLst>
               <a:ext uri="{FF2B5EF4-FFF2-40B4-BE49-F238E27FC236}">
-                <a16:creationId xmlns:a16="http://schemas.microsoft.com/office/drawing/2014/main" id="{FB65E884-F899-1565-7D14-A84FCEFA2AF6}"/>
+                <a16:creationId xmlns:a16="http://schemas.microsoft.com/office/drawing/2014/main" id="{59093DC0-399F-BAE4-C26D-669D059C09B6}"/>
               </a:ext>
             </a:extLst>
           </p:cNvPr>
@@ -3471,14 +3473,30 @@
           <a:bodyPr/>
           <a:lstStyle/>
           <a:p>
-            <a:endParaRPr lang="en-US"/>
+            <a:r>
+              <a:rPr lang="hr-HR" dirty="0"/>
+              <a:t>argument : </a:t>
+            </a:r>
+            <a:r>
+              <a:rPr lang="hr-HR" dirty="0">
+                <a:solidFill>
+                  <a:srgbClr val="00B0F0"/>
+                </a:solidFill>
+              </a:rPr>
+              <a:t>width</a:t>
+            </a:r>
+            <a:endParaRPr lang="en-US" dirty="0">
+              <a:solidFill>
+                <a:srgbClr val="00B0F0"/>
+              </a:solidFill>
+            </a:endParaRPr>
           </a:p>
         </p:txBody>
       </p:sp>
     </p:spTree>
     <p:extLst>
       <p:ext uri="{BB962C8B-B14F-4D97-AF65-F5344CB8AC3E}">
-        <p14:creationId xmlns:p14="http://schemas.microsoft.com/office/powerpoint/2010/main" val="601141755"/>
+        <p14:creationId xmlns:p14="http://schemas.microsoft.com/office/powerpoint/2010/main" val="614511011"/>
       </p:ext>
     </p:extLst>
   </p:cSld>
@@ -3510,7 +3528,7 @@
           <p:cNvPr id="2" name="Title 1">
             <a:extLst>
               <a:ext uri="{FF2B5EF4-FFF2-40B4-BE49-F238E27FC236}">
-                <a16:creationId xmlns:a16="http://schemas.microsoft.com/office/drawing/2014/main" id="{9F96E68C-3376-C114-7ACC-06A7333A4185}"/>
+                <a16:creationId xmlns:a16="http://schemas.microsoft.com/office/drawing/2014/main" id="{72DAB73D-586A-3DD7-6754-6C0E5A0B437C}"/>
               </a:ext>
             </a:extLst>
           </p:cNvPr>
@@ -3528,7 +3546,7 @@
           <a:p>
             <a:r>
               <a:rPr lang="hr-HR" dirty="0"/>
-              <a:t>class Snake</a:t>
+              <a:t>class Game : GameForm</a:t>
             </a:r>
             <a:endParaRPr lang="en-US" dirty="0"/>
           </a:p>
@@ -3539,7 +3557,7 @@
           <p:cNvPr id="3" name="Content Placeholder 2">
             <a:extLst>
               <a:ext uri="{FF2B5EF4-FFF2-40B4-BE49-F238E27FC236}">
-                <a16:creationId xmlns:a16="http://schemas.microsoft.com/office/drawing/2014/main" id="{CD12693D-8372-01E1-87A9-C799C86D3EA8}"/>
+                <a16:creationId xmlns:a16="http://schemas.microsoft.com/office/drawing/2014/main" id="{47A4A945-B0C9-EB6E-E9B1-1702BC68F4AD}"/>
               </a:ext>
             </a:extLst>
           </p:cNvPr>
@@ -3555,14 +3573,20 @@
           <a:bodyPr/>
           <a:lstStyle/>
           <a:p>
-            <a:endParaRPr lang="en-US"/>
+            <a:r>
+              <a:rPr lang="hr-HR" dirty="0"/>
+              <a:t>služi dizajneru igre u izradi logike po shemi igrica</a:t>
+            </a:r>
+          </a:p>
+          <a:p>
+            <a:endParaRPr lang="en-US" dirty="0"/>
           </a:p>
         </p:txBody>
       </p:sp>
     </p:spTree>
     <p:extLst>
       <p:ext uri="{BB962C8B-B14F-4D97-AF65-F5344CB8AC3E}">
-        <p14:creationId xmlns:p14="http://schemas.microsoft.com/office/powerpoint/2010/main" val="3286224332"/>
+        <p14:creationId xmlns:p14="http://schemas.microsoft.com/office/powerpoint/2010/main" val="2013795389"/>
       </p:ext>
     </p:extLst>
   </p:cSld>
@@ -3594,6 +3618,174 @@
           <p:cNvPr id="2" name="Title 1">
             <a:extLst>
               <a:ext uri="{FF2B5EF4-FFF2-40B4-BE49-F238E27FC236}">
+                <a16:creationId xmlns:a16="http://schemas.microsoft.com/office/drawing/2014/main" id="{568FAC47-4F40-576E-683E-84D1683EE49E}"/>
+              </a:ext>
+            </a:extLst>
+          </p:cNvPr>
+          <p:cNvSpPr>
+            <a:spLocks noGrp="1"/>
+          </p:cNvSpPr>
+          <p:nvPr>
+            <p:ph type="title"/>
+          </p:nvPr>
+        </p:nvSpPr>
+        <p:spPr/>
+        <p:txBody>
+          <a:bodyPr/>
+          <a:lstStyle/>
+          <a:p>
+            <a:r>
+              <a:rPr lang="hr-HR" dirty="0"/>
+              <a:t>class Varijable</a:t>
+            </a:r>
+            <a:endParaRPr lang="en-US" dirty="0"/>
+          </a:p>
+        </p:txBody>
+      </p:sp>
+      <p:sp>
+        <p:nvSpPr>
+          <p:cNvPr id="3" name="Content Placeholder 2">
+            <a:extLst>
+              <a:ext uri="{FF2B5EF4-FFF2-40B4-BE49-F238E27FC236}">
+                <a16:creationId xmlns:a16="http://schemas.microsoft.com/office/drawing/2014/main" id="{FB65E884-F899-1565-7D14-A84FCEFA2AF6}"/>
+              </a:ext>
+            </a:extLst>
+          </p:cNvPr>
+          <p:cNvSpPr>
+            <a:spLocks noGrp="1"/>
+          </p:cNvSpPr>
+          <p:nvPr>
+            <p:ph idx="1"/>
+          </p:nvPr>
+        </p:nvSpPr>
+        <p:spPr/>
+        <p:txBody>
+          <a:bodyPr/>
+          <a:lstStyle/>
+          <a:p>
+            <a:endParaRPr lang="en-US"/>
+          </a:p>
+        </p:txBody>
+      </p:sp>
+    </p:spTree>
+    <p:extLst>
+      <p:ext uri="{BB962C8B-B14F-4D97-AF65-F5344CB8AC3E}">
+        <p14:creationId xmlns:p14="http://schemas.microsoft.com/office/powerpoint/2010/main" val="601141755"/>
+      </p:ext>
+    </p:extLst>
+  </p:cSld>
+  <p:clrMapOvr>
+    <a:masterClrMapping/>
+  </p:clrMapOvr>
+</p:sld>
+</file>
+
+<file path=ppt/slides/slide13.xml><?xml version="1.0" encoding="utf-8"?>
+<p:sld xmlns:a="http://schemas.openxmlformats.org/drawingml/2006/main" xmlns:r="http://schemas.openxmlformats.org/officeDocument/2006/relationships" xmlns:p="http://schemas.openxmlformats.org/presentationml/2006/main">
+  <p:cSld>
+    <p:spTree>
+      <p:nvGrpSpPr>
+        <p:cNvPr id="1" name=""/>
+        <p:cNvGrpSpPr/>
+        <p:nvPr/>
+      </p:nvGrpSpPr>
+      <p:grpSpPr>
+        <a:xfrm>
+          <a:off x="0" y="0"/>
+          <a:ext cx="0" cy="0"/>
+          <a:chOff x="0" y="0"/>
+          <a:chExt cx="0" cy="0"/>
+        </a:xfrm>
+      </p:grpSpPr>
+      <p:sp>
+        <p:nvSpPr>
+          <p:cNvPr id="2" name="Title 1">
+            <a:extLst>
+              <a:ext uri="{FF2B5EF4-FFF2-40B4-BE49-F238E27FC236}">
+                <a16:creationId xmlns:a16="http://schemas.microsoft.com/office/drawing/2014/main" id="{9F96E68C-3376-C114-7ACC-06A7333A4185}"/>
+              </a:ext>
+            </a:extLst>
+          </p:cNvPr>
+          <p:cNvSpPr>
+            <a:spLocks noGrp="1"/>
+          </p:cNvSpPr>
+          <p:nvPr>
+            <p:ph type="title"/>
+          </p:nvPr>
+        </p:nvSpPr>
+        <p:spPr/>
+        <p:txBody>
+          <a:bodyPr/>
+          <a:lstStyle/>
+          <a:p>
+            <a:r>
+              <a:rPr lang="hr-HR" dirty="0"/>
+              <a:t>class Snake</a:t>
+            </a:r>
+            <a:endParaRPr lang="en-US" dirty="0"/>
+          </a:p>
+        </p:txBody>
+      </p:sp>
+      <p:sp>
+        <p:nvSpPr>
+          <p:cNvPr id="3" name="Content Placeholder 2">
+            <a:extLst>
+              <a:ext uri="{FF2B5EF4-FFF2-40B4-BE49-F238E27FC236}">
+                <a16:creationId xmlns:a16="http://schemas.microsoft.com/office/drawing/2014/main" id="{CD12693D-8372-01E1-87A9-C799C86D3EA8}"/>
+              </a:ext>
+            </a:extLst>
+          </p:cNvPr>
+          <p:cNvSpPr>
+            <a:spLocks noGrp="1"/>
+          </p:cNvSpPr>
+          <p:nvPr>
+            <p:ph idx="1"/>
+          </p:nvPr>
+        </p:nvSpPr>
+        <p:spPr/>
+        <p:txBody>
+          <a:bodyPr/>
+          <a:lstStyle/>
+          <a:p>
+            <a:endParaRPr lang="en-US"/>
+          </a:p>
+        </p:txBody>
+      </p:sp>
+    </p:spTree>
+    <p:extLst>
+      <p:ext uri="{BB962C8B-B14F-4D97-AF65-F5344CB8AC3E}">
+        <p14:creationId xmlns:p14="http://schemas.microsoft.com/office/powerpoint/2010/main" val="3286224332"/>
+      </p:ext>
+    </p:extLst>
+  </p:cSld>
+  <p:clrMapOvr>
+    <a:masterClrMapping/>
+  </p:clrMapOvr>
+</p:sld>
+</file>
+
+<file path=ppt/slides/slide14.xml><?xml version="1.0" encoding="utf-8"?>
+<p:sld xmlns:a="http://schemas.openxmlformats.org/drawingml/2006/main" xmlns:r="http://schemas.openxmlformats.org/officeDocument/2006/relationships" xmlns:p="http://schemas.openxmlformats.org/presentationml/2006/main">
+  <p:cSld>
+    <p:spTree>
+      <p:nvGrpSpPr>
+        <p:cNvPr id="1" name=""/>
+        <p:cNvGrpSpPr/>
+        <p:nvPr/>
+      </p:nvGrpSpPr>
+      <p:grpSpPr>
+        <a:xfrm>
+          <a:off x="0" y="0"/>
+          <a:ext cx="0" cy="0"/>
+          <a:chOff x="0" y="0"/>
+          <a:chExt cx="0" cy="0"/>
+        </a:xfrm>
+      </p:grpSpPr>
+      <p:sp>
+        <p:nvSpPr>
+          <p:cNvPr id="2" name="Title 1">
+            <a:extLst>
+              <a:ext uri="{FF2B5EF4-FFF2-40B4-BE49-F238E27FC236}">
                 <a16:creationId xmlns:a16="http://schemas.microsoft.com/office/drawing/2014/main" id="{A4329D90-0308-1849-9FB7-22637C69AE80}"/>
               </a:ext>
             </a:extLst>
@@ -3656,7 +3848,7 @@
 </p:sld>
 </file>
 
-<file path=ppt/slides/slide13.xml><?xml version="1.0" encoding="utf-8"?>
+<file path=ppt/slides/slide15.xml><?xml version="1.0" encoding="utf-8"?>
 <p:sld xmlns:a="http://schemas.openxmlformats.org/drawingml/2006/main" xmlns:r="http://schemas.openxmlformats.org/officeDocument/2006/relationships" xmlns:p="http://schemas.openxmlformats.org/presentationml/2006/main">
   <p:cSld>
     <p:spTree>
@@ -4472,8 +4664,16 @@
           <a:p>
             <a:pPr lvl="1"/>
             <a:r>
-              <a:rPr lang="hr-HR" dirty="0"/>
-              <a:t>Varijable </a:t>
+              <a:rPr lang="hr-HR" dirty="0">
+                <a:solidFill>
+                  <a:srgbClr val="00B050"/>
+                </a:solidFill>
+              </a:rPr>
+              <a:t>Varijable</a:t>
+            </a:r>
+            <a:r>
+              <a:rPr lang="hr-HR" dirty="0"/>
+              <a:t> </a:t>
             </a:r>
             <a:r>
               <a:rPr lang="hr-HR" dirty="0">
@@ -4481,8 +4681,23 @@
                   <a:srgbClr val="00B0F0"/>
                 </a:solidFill>
               </a:rPr>
-              <a:t>varjable</a:t>
-            </a:r>
+              <a:t>varjable </a:t>
+            </a:r>
+            <a:r>
+              <a:rPr lang="hr-HR" dirty="0">
+                <a:solidFill>
+                  <a:schemeClr val="bg1">
+                    <a:lumMod val="50000"/>
+                  </a:schemeClr>
+                </a:solidFill>
+              </a:rPr>
+              <a:t>... (na prezentaciji)</a:t>
+            </a:r>
+            <a:endParaRPr lang="hr-HR" dirty="0">
+              <a:solidFill>
+                <a:srgbClr val="00B0F0"/>
+              </a:solidFill>
+            </a:endParaRPr>
           </a:p>
           <a:p>
             <a:pPr lvl="1"/>
@@ -4519,7 +4734,7 @@
             </a:r>
             <a:r>
               <a:rPr lang="hr-HR" dirty="0"/>
-              <a:t> ... lista svih inicjaliziranih ekrana</a:t>
+              <a:t> ... lista svih inicjaliziranih T.L.Panela</a:t>
             </a:r>
           </a:p>
           <a:p>
@@ -4683,7 +4898,17 @@
             </a:r>
             <a:r>
               <a:rPr lang="hr-HR" dirty="0"/>
-              <a:t>( int width )</a:t>
+              <a:t>( int width ) ... </a:t>
+            </a:r>
+            <a:r>
+              <a:rPr lang="hr-HR" dirty="0">
+                <a:solidFill>
+                  <a:schemeClr val="bg1">
+                    <a:lumMod val="50000"/>
+                  </a:schemeClr>
+                </a:solidFill>
+              </a:rPr>
+              <a:t>(na prezentaciji)</a:t>
             </a:r>
           </a:p>
           <a:p>
@@ -4702,7 +4927,17 @@
             </a:r>
             <a:r>
               <a:rPr lang="hr-HR" dirty="0"/>
-              <a:t>( int width )</a:t>
+              <a:t>( int width ) ... </a:t>
+            </a:r>
+            <a:r>
+              <a:rPr lang="hr-HR" dirty="0">
+                <a:solidFill>
+                  <a:schemeClr val="bg1">
+                    <a:lumMod val="50000"/>
+                  </a:schemeClr>
+                </a:solidFill>
+              </a:rPr>
+              <a:t>(na prezentaciji)</a:t>
             </a:r>
           </a:p>
           <a:p>
@@ -4954,7 +5189,7 @@
           <p:cNvPr id="2" name="Title 1">
             <a:extLst>
               <a:ext uri="{FF2B5EF4-FFF2-40B4-BE49-F238E27FC236}">
-                <a16:creationId xmlns:a16="http://schemas.microsoft.com/office/drawing/2014/main" id="{72DAB73D-586A-3DD7-6754-6C0E5A0B437C}"/>
+                <a16:creationId xmlns:a16="http://schemas.microsoft.com/office/drawing/2014/main" id="{2F9A3067-A73C-B706-5A15-577B7589345A}"/>
               </a:ext>
             </a:extLst>
           </p:cNvPr>
@@ -4972,7 +5207,7 @@
           <a:p>
             <a:r>
               <a:rPr lang="hr-HR" dirty="0"/>
-              <a:t>class Game : GameForm</a:t>
+              <a:t>GameForm.InitializeScreen</a:t>
             </a:r>
             <a:endParaRPr lang="en-US" dirty="0"/>
           </a:p>
@@ -4983,7 +5218,7 @@
           <p:cNvPr id="3" name="Content Placeholder 2">
             <a:extLst>
               <a:ext uri="{FF2B5EF4-FFF2-40B4-BE49-F238E27FC236}">
-                <a16:creationId xmlns:a16="http://schemas.microsoft.com/office/drawing/2014/main" id="{47A4A945-B0C9-EB6E-E9B1-1702BC68F4AD}"/>
+                <a16:creationId xmlns:a16="http://schemas.microsoft.com/office/drawing/2014/main" id="{59093DC0-399F-BAE4-C26D-669D059C09B6}"/>
               </a:ext>
             </a:extLst>
           </p:cNvPr>
@@ -5001,18 +5236,28 @@
           <a:p>
             <a:r>
               <a:rPr lang="hr-HR" dirty="0"/>
-              <a:t>služi dizajneru igre u izradi logike</a:t>
-            </a:r>
-          </a:p>
-          <a:p>
-            <a:endParaRPr lang="en-US" dirty="0"/>
+              <a:t>argument : </a:t>
+            </a:r>
+            <a:r>
+              <a:rPr lang="hr-HR" dirty="0">
+                <a:solidFill>
+                  <a:srgbClr val="00B0F0"/>
+                </a:solidFill>
+              </a:rPr>
+              <a:t>width</a:t>
+            </a:r>
+            <a:endParaRPr lang="en-US" dirty="0">
+              <a:solidFill>
+                <a:srgbClr val="00B0F0"/>
+              </a:solidFill>
+            </a:endParaRPr>
           </a:p>
         </p:txBody>
       </p:sp>
     </p:spTree>
     <p:extLst>
       <p:ext uri="{BB962C8B-B14F-4D97-AF65-F5344CB8AC3E}">
-        <p14:creationId xmlns:p14="http://schemas.microsoft.com/office/powerpoint/2010/main" val="2013795389"/>
+        <p14:creationId xmlns:p14="http://schemas.microsoft.com/office/powerpoint/2010/main" val="1609527602"/>
       </p:ext>
     </p:extLst>
   </p:cSld>

</xml_diff>

<commit_message>
Napravio svoj dio dokumentacije.
</commit_message>
<xml_diff>
--- a/docs/Zmijica.pptx
+++ b/docs/Zmijica.pptx
@@ -9,17 +9,22 @@
     <p:sldId id="264" r:id="rId3"/>
     <p:sldId id="265" r:id="rId4"/>
     <p:sldId id="266" r:id="rId5"/>
-    <p:sldId id="267" r:id="rId6"/>
-    <p:sldId id="257" r:id="rId7"/>
-    <p:sldId id="258" r:id="rId8"/>
-    <p:sldId id="268" r:id="rId9"/>
-    <p:sldId id="269" r:id="rId10"/>
-    <p:sldId id="270" r:id="rId11"/>
-    <p:sldId id="259" r:id="rId12"/>
-    <p:sldId id="263" r:id="rId13"/>
-    <p:sldId id="260" r:id="rId14"/>
-    <p:sldId id="261" r:id="rId15"/>
-    <p:sldId id="262" r:id="rId16"/>
+    <p:sldId id="276" r:id="rId6"/>
+    <p:sldId id="267" r:id="rId7"/>
+    <p:sldId id="257" r:id="rId8"/>
+    <p:sldId id="258" r:id="rId9"/>
+    <p:sldId id="268" r:id="rId10"/>
+    <p:sldId id="269" r:id="rId11"/>
+    <p:sldId id="270" r:id="rId12"/>
+    <p:sldId id="259" r:id="rId13"/>
+    <p:sldId id="271" r:id="rId14"/>
+    <p:sldId id="273" r:id="rId15"/>
+    <p:sldId id="272" r:id="rId16"/>
+    <p:sldId id="274" r:id="rId17"/>
+    <p:sldId id="263" r:id="rId18"/>
+    <p:sldId id="262" r:id="rId19"/>
+    <p:sldId id="260" r:id="rId20"/>
+    <p:sldId id="275" r:id="rId21"/>
   </p:sldIdLst>
   <p:sldSz cx="12192000" cy="6858000"/>
   <p:notesSz cx="6858000" cy="9144000"/>
@@ -118,6 +123,11 @@
       </a:defRPr>
     </a:lvl9pPr>
   </p:defaultTextStyle>
+  <p:extLst>
+    <p:ext uri="{EFAFB233-063F-42B5-8137-9DF3F51BA10A}">
+      <p15:sldGuideLst xmlns:p15="http://schemas.microsoft.com/office/powerpoint/2012/main"/>
+    </p:ext>
+  </p:extLst>
 </p:presentation>
 </file>
 
@@ -268,7 +278,7 @@
           <a:p>
             <a:fld id="{AD2B4A90-767B-4FA0-B1A9-AB4508C43796}" type="datetimeFigureOut">
               <a:rPr lang="en-US" smtClean="0"/>
-              <a:t>1/15/2024</a:t>
+              <a:t>1/18/2024</a:t>
             </a:fld>
             <a:endParaRPr lang="en-US"/>
           </a:p>
@@ -466,7 +476,7 @@
           <a:p>
             <a:fld id="{AD2B4A90-767B-4FA0-B1A9-AB4508C43796}" type="datetimeFigureOut">
               <a:rPr lang="en-US" smtClean="0"/>
-              <a:t>1/15/2024</a:t>
+              <a:t>1/18/2024</a:t>
             </a:fld>
             <a:endParaRPr lang="en-US"/>
           </a:p>
@@ -674,7 +684,7 @@
           <a:p>
             <a:fld id="{AD2B4A90-767B-4FA0-B1A9-AB4508C43796}" type="datetimeFigureOut">
               <a:rPr lang="en-US" smtClean="0"/>
-              <a:t>1/15/2024</a:t>
+              <a:t>1/18/2024</a:t>
             </a:fld>
             <a:endParaRPr lang="en-US"/>
           </a:p>
@@ -872,7 +882,7 @@
           <a:p>
             <a:fld id="{AD2B4A90-767B-4FA0-B1A9-AB4508C43796}" type="datetimeFigureOut">
               <a:rPr lang="en-US" smtClean="0"/>
-              <a:t>1/15/2024</a:t>
+              <a:t>1/18/2024</a:t>
             </a:fld>
             <a:endParaRPr lang="en-US"/>
           </a:p>
@@ -1147,7 +1157,7 @@
           <a:p>
             <a:fld id="{AD2B4A90-767B-4FA0-B1A9-AB4508C43796}" type="datetimeFigureOut">
               <a:rPr lang="en-US" smtClean="0"/>
-              <a:t>1/15/2024</a:t>
+              <a:t>1/18/2024</a:t>
             </a:fld>
             <a:endParaRPr lang="en-US"/>
           </a:p>
@@ -1412,7 +1422,7 @@
           <a:p>
             <a:fld id="{AD2B4A90-767B-4FA0-B1A9-AB4508C43796}" type="datetimeFigureOut">
               <a:rPr lang="en-US" smtClean="0"/>
-              <a:t>1/15/2024</a:t>
+              <a:t>1/18/2024</a:t>
             </a:fld>
             <a:endParaRPr lang="en-US"/>
           </a:p>
@@ -1824,7 +1834,7 @@
           <a:p>
             <a:fld id="{AD2B4A90-767B-4FA0-B1A9-AB4508C43796}" type="datetimeFigureOut">
               <a:rPr lang="en-US" smtClean="0"/>
-              <a:t>1/15/2024</a:t>
+              <a:t>1/18/2024</a:t>
             </a:fld>
             <a:endParaRPr lang="en-US"/>
           </a:p>
@@ -1965,7 +1975,7 @@
           <a:p>
             <a:fld id="{AD2B4A90-767B-4FA0-B1A9-AB4508C43796}" type="datetimeFigureOut">
               <a:rPr lang="en-US" smtClean="0"/>
-              <a:t>1/15/2024</a:t>
+              <a:t>1/18/2024</a:t>
             </a:fld>
             <a:endParaRPr lang="en-US"/>
           </a:p>
@@ -2078,7 +2088,7 @@
           <a:p>
             <a:fld id="{AD2B4A90-767B-4FA0-B1A9-AB4508C43796}" type="datetimeFigureOut">
               <a:rPr lang="en-US" smtClean="0"/>
-              <a:t>1/15/2024</a:t>
+              <a:t>1/18/2024</a:t>
             </a:fld>
             <a:endParaRPr lang="en-US"/>
           </a:p>
@@ -2389,7 +2399,7 @@
           <a:p>
             <a:fld id="{AD2B4A90-767B-4FA0-B1A9-AB4508C43796}" type="datetimeFigureOut">
               <a:rPr lang="en-US" smtClean="0"/>
-              <a:t>1/15/2024</a:t>
+              <a:t>1/18/2024</a:t>
             </a:fld>
             <a:endParaRPr lang="en-US"/>
           </a:p>
@@ -2677,7 +2687,7 @@
           <a:p>
             <a:fld id="{AD2B4A90-767B-4FA0-B1A9-AB4508C43796}" type="datetimeFigureOut">
               <a:rPr lang="en-US" smtClean="0"/>
-              <a:t>1/15/2024</a:t>
+              <a:t>1/18/2024</a:t>
             </a:fld>
             <a:endParaRPr lang="en-US"/>
           </a:p>
@@ -2918,7 +2928,7 @@
           <a:p>
             <a:fld id="{AD2B4A90-767B-4FA0-B1A9-AB4508C43796}" type="datetimeFigureOut">
               <a:rPr lang="en-US" smtClean="0"/>
-              <a:t>1/15/2024</a:t>
+              <a:t>1/18/2024</a:t>
             </a:fld>
             <a:endParaRPr lang="en-US"/>
           </a:p>
@@ -3446,7 +3456,7 @@
           <a:p>
             <a:r>
               <a:rPr lang="hr-HR" dirty="0"/>
-              <a:t>GameForm.GetScreen</a:t>
+              <a:t>GameForm.InitializeScreen</a:t>
             </a:r>
             <a:endParaRPr lang="en-US" dirty="0"/>
           </a:p>
@@ -3491,12 +3501,131 @@
               </a:solidFill>
             </a:endParaRPr>
           </a:p>
+          <a:p>
+            <a:r>
+              <a:rPr lang="en-US" dirty="0" err="1"/>
+              <a:t>povratni</a:t>
+            </a:r>
+            <a:r>
+              <a:rPr lang="en-US" dirty="0"/>
+              <a:t> tip :</a:t>
+            </a:r>
+            <a:r>
+              <a:rPr lang="en-US" dirty="0">
+                <a:solidFill>
+                  <a:srgbClr val="00B0F0"/>
+                </a:solidFill>
+              </a:rPr>
+              <a:t> </a:t>
+            </a:r>
+            <a:r>
+              <a:rPr lang="en-US" dirty="0" err="1">
+                <a:solidFill>
+                  <a:srgbClr val="00B050"/>
+                </a:solidFill>
+              </a:rPr>
+              <a:t>TableLayoutPanel</a:t>
+            </a:r>
+            <a:endParaRPr lang="en-US" dirty="0">
+              <a:solidFill>
+                <a:srgbClr val="00B050"/>
+              </a:solidFill>
+            </a:endParaRPr>
+          </a:p>
+          <a:p>
+            <a:r>
+              <a:rPr lang="en-US" dirty="0" err="1"/>
+              <a:t>stvara</a:t>
+            </a:r>
+            <a:r>
+              <a:rPr lang="en-US" dirty="0"/>
+              <a:t> TLP </a:t>
+            </a:r>
+            <a:r>
+              <a:rPr lang="en-US" dirty="0" err="1"/>
+              <a:t>dimenzija</a:t>
+            </a:r>
+            <a:r>
+              <a:rPr lang="en-US" dirty="0"/>
+              <a:t> width </a:t>
+            </a:r>
+          </a:p>
+          <a:p>
+            <a:r>
+              <a:rPr lang="en-US" dirty="0"/>
+              <a:t>u </a:t>
+            </a:r>
+            <a:r>
+              <a:rPr lang="en-US" dirty="0" err="1"/>
+              <a:t>svaku</a:t>
+            </a:r>
+            <a:r>
+              <a:rPr lang="en-US" dirty="0"/>
+              <a:t> </a:t>
+            </a:r>
+            <a:r>
+              <a:rPr lang="en-US" dirty="0" err="1"/>
+              <a:t>čeliju</a:t>
+            </a:r>
+            <a:r>
+              <a:rPr lang="en-US" dirty="0"/>
+              <a:t> </a:t>
+            </a:r>
+            <a:r>
+              <a:rPr lang="en-US" dirty="0" err="1"/>
+              <a:t>stavlja</a:t>
+            </a:r>
+            <a:r>
+              <a:rPr lang="en-US" dirty="0"/>
+              <a:t> panel</a:t>
+            </a:r>
+          </a:p>
+          <a:p>
+            <a:pPr lvl="1"/>
+            <a:r>
+              <a:rPr lang="en-US" dirty="0" err="1"/>
+              <a:t>panelima</a:t>
+            </a:r>
+            <a:r>
+              <a:rPr lang="en-US" dirty="0"/>
+              <a:t> se </a:t>
+            </a:r>
+            <a:r>
+              <a:rPr lang="en-US" dirty="0" err="1"/>
+              <a:t>mijenjaju</a:t>
+            </a:r>
+            <a:r>
+              <a:rPr lang="en-US" dirty="0"/>
+              <a:t> </a:t>
+            </a:r>
+            <a:r>
+              <a:rPr lang="en-US" dirty="0" err="1"/>
+              <a:t>BackgroundColor</a:t>
+            </a:r>
+            <a:r>
+              <a:rPr lang="en-US" dirty="0"/>
+              <a:t> </a:t>
+            </a:r>
+            <a:r>
+              <a:rPr lang="en-US" dirty="0" err="1"/>
+              <a:t>krz</a:t>
+            </a:r>
+            <a:r>
+              <a:rPr lang="en-US" dirty="0"/>
+              <a:t> </a:t>
+            </a:r>
+            <a:r>
+              <a:rPr lang="en-US" dirty="0" err="1"/>
+              <a:t>igru</a:t>
+            </a:r>
+            <a:endParaRPr lang="en-US" dirty="0"/>
+          </a:p>
         </p:txBody>
       </p:sp>
     </p:spTree>
     <p:extLst>
       <p:ext uri="{BB962C8B-B14F-4D97-AF65-F5344CB8AC3E}">
-        <p14:creationId xmlns:p14="http://schemas.microsoft.com/office/powerpoint/2010/main" val="614511011"/>
+        <p14:creationId xmlns:p14="http://schemas.microsoft.com/office/powerpoint/2010/main" val="1609527602"/>
       </p:ext>
     </p:extLst>
   </p:cSld>
@@ -3528,7 +3657,7 @@
           <p:cNvPr id="2" name="Title 1">
             <a:extLst>
               <a:ext uri="{FF2B5EF4-FFF2-40B4-BE49-F238E27FC236}">
-                <a16:creationId xmlns:a16="http://schemas.microsoft.com/office/drawing/2014/main" id="{72DAB73D-586A-3DD7-6754-6C0E5A0B437C}"/>
+                <a16:creationId xmlns:a16="http://schemas.microsoft.com/office/drawing/2014/main" id="{2F9A3067-A73C-B706-5A15-577B7589345A}"/>
               </a:ext>
             </a:extLst>
           </p:cNvPr>
@@ -3546,7 +3675,7 @@
           <a:p>
             <a:r>
               <a:rPr lang="hr-HR" dirty="0"/>
-              <a:t>class Game : GameForm</a:t>
+              <a:t>GameForm.GetScreen</a:t>
             </a:r>
             <a:endParaRPr lang="en-US" dirty="0"/>
           </a:p>
@@ -3557,7 +3686,7 @@
           <p:cNvPr id="3" name="Content Placeholder 2">
             <a:extLst>
               <a:ext uri="{FF2B5EF4-FFF2-40B4-BE49-F238E27FC236}">
-                <a16:creationId xmlns:a16="http://schemas.microsoft.com/office/drawing/2014/main" id="{47A4A945-B0C9-EB6E-E9B1-1702BC68F4AD}"/>
+                <a16:creationId xmlns:a16="http://schemas.microsoft.com/office/drawing/2014/main" id="{59093DC0-399F-BAE4-C26D-669D059C09B6}"/>
               </a:ext>
             </a:extLst>
           </p:cNvPr>
@@ -3575,18 +3704,125 @@
           <a:p>
             <a:r>
               <a:rPr lang="hr-HR" dirty="0"/>
-              <a:t>služi dizajneru igre u izradi logike po shemi igrica</a:t>
-            </a:r>
-          </a:p>
-          <a:p>
-            <a:endParaRPr lang="en-US" dirty="0"/>
+              <a:t>argument : </a:t>
+            </a:r>
+            <a:r>
+              <a:rPr lang="hr-HR" dirty="0">
+                <a:solidFill>
+                  <a:srgbClr val="00B0F0"/>
+                </a:solidFill>
+              </a:rPr>
+              <a:t>width</a:t>
+            </a:r>
+            <a:endParaRPr lang="en-US" dirty="0">
+              <a:solidFill>
+                <a:srgbClr val="00B0F0"/>
+              </a:solidFill>
+            </a:endParaRPr>
+          </a:p>
+          <a:p>
+            <a:r>
+              <a:rPr lang="en-US" dirty="0" err="1"/>
+              <a:t>provjerava</a:t>
+            </a:r>
+            <a:r>
+              <a:rPr lang="en-US" dirty="0"/>
+              <a:t> </a:t>
+            </a:r>
+            <a:r>
+              <a:rPr lang="en-US" dirty="0" err="1"/>
+              <a:t>posotji</a:t>
+            </a:r>
+            <a:r>
+              <a:rPr lang="en-US" dirty="0"/>
+              <a:t> li </a:t>
+            </a:r>
+            <a:r>
+              <a:rPr lang="en-US" dirty="0">
+                <a:solidFill>
+                  <a:srgbClr val="00B050"/>
+                </a:solidFill>
+              </a:rPr>
+              <a:t>TLP</a:t>
+            </a:r>
+            <a:r>
+              <a:rPr lang="en-US" dirty="0"/>
+              <a:t> </a:t>
+            </a:r>
+            <a:r>
+              <a:rPr lang="en-US" dirty="0" err="1"/>
+              <a:t>tih</a:t>
+            </a:r>
+            <a:r>
+              <a:rPr lang="en-US" dirty="0"/>
+              <a:t> </a:t>
+            </a:r>
+            <a:r>
+              <a:rPr lang="en-US" dirty="0" err="1"/>
+              <a:t>dimenzija</a:t>
+            </a:r>
+            <a:r>
+              <a:rPr lang="en-US" dirty="0"/>
+              <a:t> u </a:t>
+            </a:r>
+            <a:r>
+              <a:rPr lang="en-US" dirty="0" err="1"/>
+              <a:t>listi</a:t>
+            </a:r>
+            <a:r>
+              <a:rPr lang="en-US" dirty="0"/>
+              <a:t> screens</a:t>
+            </a:r>
+          </a:p>
+          <a:p>
+            <a:r>
+              <a:rPr lang="en-US" dirty="0" err="1"/>
+              <a:t>ako</a:t>
+            </a:r>
+            <a:r>
+              <a:rPr lang="en-US" dirty="0"/>
+              <a:t> ne, </a:t>
+            </a:r>
+            <a:r>
+              <a:rPr lang="en-US" dirty="0" err="1"/>
+              <a:t>radi</a:t>
+            </a:r>
+            <a:r>
+              <a:rPr lang="en-US" dirty="0"/>
+              <a:t> </a:t>
+            </a:r>
+            <a:r>
+              <a:rPr lang="en-US" dirty="0" err="1"/>
+              <a:t>novi</a:t>
+            </a:r>
+            <a:r>
+              <a:rPr lang="en-US" dirty="0"/>
+              <a:t> s </a:t>
+            </a:r>
+            <a:r>
+              <a:rPr lang="en-US" dirty="0" err="1"/>
+              <a:t>GameForm.</a:t>
+            </a:r>
+            <a:r>
+              <a:rPr lang="en-US" dirty="0" err="1">
+                <a:solidFill>
+                  <a:srgbClr val="FFC000"/>
+                </a:solidFill>
+              </a:rPr>
+              <a:t>InitializeScreen</a:t>
+            </a:r>
+            <a:endParaRPr lang="en-US" dirty="0">
+              <a:solidFill>
+                <a:srgbClr val="FFC000"/>
+              </a:solidFill>
+            </a:endParaRPr>
           </a:p>
         </p:txBody>
       </p:sp>
     </p:spTree>
     <p:extLst>
       <p:ext uri="{BB962C8B-B14F-4D97-AF65-F5344CB8AC3E}">
-        <p14:creationId xmlns:p14="http://schemas.microsoft.com/office/powerpoint/2010/main" val="2013795389"/>
+        <p14:creationId xmlns:p14="http://schemas.microsoft.com/office/powerpoint/2010/main" val="614511011"/>
       </p:ext>
     </p:extLst>
   </p:cSld>
@@ -3618,7 +3854,7 @@
           <p:cNvPr id="2" name="Title 1">
             <a:extLst>
               <a:ext uri="{FF2B5EF4-FFF2-40B4-BE49-F238E27FC236}">
-                <a16:creationId xmlns:a16="http://schemas.microsoft.com/office/drawing/2014/main" id="{568FAC47-4F40-576E-683E-84D1683EE49E}"/>
+                <a16:creationId xmlns:a16="http://schemas.microsoft.com/office/drawing/2014/main" id="{72DAB73D-586A-3DD7-6754-6C0E5A0B437C}"/>
               </a:ext>
             </a:extLst>
           </p:cNvPr>
@@ -3636,7 +3872,7 @@
           <a:p>
             <a:r>
               <a:rPr lang="hr-HR" dirty="0"/>
-              <a:t>class Varijable</a:t>
+              <a:t>class Game : GameForm</a:t>
             </a:r>
             <a:endParaRPr lang="en-US" dirty="0"/>
           </a:p>
@@ -3647,7 +3883,7 @@
           <p:cNvPr id="3" name="Content Placeholder 2">
             <a:extLst>
               <a:ext uri="{FF2B5EF4-FFF2-40B4-BE49-F238E27FC236}">
-                <a16:creationId xmlns:a16="http://schemas.microsoft.com/office/drawing/2014/main" id="{FB65E884-F899-1565-7D14-A84FCEFA2AF6}"/>
+                <a16:creationId xmlns:a16="http://schemas.microsoft.com/office/drawing/2014/main" id="{47A4A945-B0C9-EB6E-E9B1-1702BC68F4AD}"/>
               </a:ext>
             </a:extLst>
           </p:cNvPr>
@@ -3663,14 +3899,20 @@
           <a:bodyPr/>
           <a:lstStyle/>
           <a:p>
-            <a:endParaRPr lang="en-US"/>
+            <a:r>
+              <a:rPr lang="hr-HR" dirty="0"/>
+              <a:t>služi dizajneru igre u izradi logike po shemi igrica</a:t>
+            </a:r>
+          </a:p>
+          <a:p>
+            <a:endParaRPr lang="en-US" dirty="0"/>
           </a:p>
         </p:txBody>
       </p:sp>
     </p:spTree>
     <p:extLst>
       <p:ext uri="{BB962C8B-B14F-4D97-AF65-F5344CB8AC3E}">
-        <p14:creationId xmlns:p14="http://schemas.microsoft.com/office/powerpoint/2010/main" val="601141755"/>
+        <p14:creationId xmlns:p14="http://schemas.microsoft.com/office/powerpoint/2010/main" val="2013795389"/>
       </p:ext>
     </p:extLst>
   </p:cSld>
@@ -3702,7 +3944,7 @@
           <p:cNvPr id="2" name="Title 1">
             <a:extLst>
               <a:ext uri="{FF2B5EF4-FFF2-40B4-BE49-F238E27FC236}">
-                <a16:creationId xmlns:a16="http://schemas.microsoft.com/office/drawing/2014/main" id="{9F96E68C-3376-C114-7ACC-06A7333A4185}"/>
+                <a16:creationId xmlns:a16="http://schemas.microsoft.com/office/drawing/2014/main" id="{72DAB73D-586A-3DD7-6754-6C0E5A0B437C}"/>
               </a:ext>
             </a:extLst>
           </p:cNvPr>
@@ -3720,7 +3962,7 @@
           <a:p>
             <a:r>
               <a:rPr lang="hr-HR" dirty="0"/>
-              <a:t>class Snake</a:t>
+              <a:t>class Game : GameForm</a:t>
             </a:r>
             <a:endParaRPr lang="en-US" dirty="0"/>
           </a:p>
@@ -3731,7 +3973,7 @@
           <p:cNvPr id="3" name="Content Placeholder 2">
             <a:extLst>
               <a:ext uri="{FF2B5EF4-FFF2-40B4-BE49-F238E27FC236}">
-                <a16:creationId xmlns:a16="http://schemas.microsoft.com/office/drawing/2014/main" id="{CD12693D-8372-01E1-87A9-C799C86D3EA8}"/>
+                <a16:creationId xmlns:a16="http://schemas.microsoft.com/office/drawing/2014/main" id="{47A4A945-B0C9-EB6E-E9B1-1702BC68F4AD}"/>
               </a:ext>
             </a:extLst>
           </p:cNvPr>
@@ -3742,19 +3984,258 @@
             <p:ph idx="1"/>
           </p:nvPr>
         </p:nvSpPr>
-        <p:spPr/>
-        <p:txBody>
-          <a:bodyPr/>
-          <a:lstStyle/>
-          <a:p>
-            <a:endParaRPr lang="en-US"/>
+        <p:spPr>
+          <a:xfrm>
+            <a:off x="838200" y="1498600"/>
+            <a:ext cx="10515600" cy="4678363"/>
+          </a:xfrm>
+        </p:spPr>
+        <p:txBody>
+          <a:bodyPr>
+            <a:normAutofit fontScale="92500" lnSpcReduction="20000"/>
+          </a:bodyPr>
+          <a:lstStyle/>
+          <a:p>
+            <a:r>
+              <a:rPr lang="hr-HR" dirty="0"/>
+              <a:t>varijable:</a:t>
+            </a:r>
+          </a:p>
+          <a:p>
+            <a:pPr lvl="1"/>
+            <a:r>
+              <a:rPr lang="hr-HR" dirty="0"/>
+              <a:t>List&lt;Point&gt; </a:t>
+            </a:r>
+            <a:r>
+              <a:rPr lang="hr-HR" sz="2600" dirty="0">
+                <a:solidFill>
+                  <a:srgbClr val="00B0F0"/>
+                </a:solidFill>
+              </a:rPr>
+              <a:t>walls</a:t>
+            </a:r>
+            <a:r>
+              <a:rPr lang="hr-HR" dirty="0"/>
+              <a:t> ... sadrži koordinate zida</a:t>
+            </a:r>
+          </a:p>
+          <a:p>
+            <a:pPr lvl="1"/>
+            <a:r>
+              <a:rPr lang="hr-HR" dirty="0"/>
+              <a:t>Stage[] </a:t>
+            </a:r>
+            <a:r>
+              <a:rPr lang="hr-HR" dirty="0">
+                <a:solidFill>
+                  <a:srgbClr val="00B0F0"/>
+                </a:solidFill>
+              </a:rPr>
+              <a:t>stage</a:t>
+            </a:r>
+            <a:r>
+              <a:rPr lang="hr-HR" dirty="0"/>
+              <a:t> ... sadrži informacije o zidovima</a:t>
+            </a:r>
+          </a:p>
+          <a:p>
+            <a:pPr lvl="1"/>
+            <a:r>
+              <a:rPr lang="hr-HR" dirty="0"/>
+              <a:t>Snake </a:t>
+            </a:r>
+            <a:r>
+              <a:rPr lang="hr-HR" dirty="0">
+                <a:solidFill>
+                  <a:srgbClr val="00B0F0"/>
+                </a:solidFill>
+              </a:rPr>
+              <a:t>snake</a:t>
+            </a:r>
+            <a:r>
+              <a:rPr lang="hr-HR" dirty="0"/>
+              <a:t> ... instanca zmije</a:t>
+            </a:r>
+          </a:p>
+          <a:p>
+            <a:pPr lvl="1"/>
+            <a:r>
+              <a:rPr lang="hr-HR" dirty="0"/>
+              <a:t>List&lt;Tuple&lt;Point, Food&gt;&gt; </a:t>
+            </a:r>
+            <a:r>
+              <a:rPr lang="hr-HR" dirty="0">
+                <a:solidFill>
+                  <a:srgbClr val="00B0F0"/>
+                </a:solidFill>
+              </a:rPr>
+              <a:t>foodPosition</a:t>
+            </a:r>
+            <a:r>
+              <a:rPr lang="hr-HR" dirty="0"/>
+              <a:t> ... pozicije hrane</a:t>
+            </a:r>
+          </a:p>
+          <a:p>
+            <a:pPr lvl="1"/>
+            <a:r>
+              <a:rPr lang="hr-HR" dirty="0"/>
+              <a:t>Point </a:t>
+            </a:r>
+            <a:r>
+              <a:rPr lang="hr-HR" dirty="0">
+                <a:solidFill>
+                  <a:srgbClr val="00B0F0"/>
+                </a:solidFill>
+              </a:rPr>
+              <a:t>direction, newDirection </a:t>
+            </a:r>
+            <a:r>
+              <a:rPr lang="hr-HR" dirty="0"/>
+              <a:t>... usmjerenje zmije</a:t>
+            </a:r>
+          </a:p>
+          <a:p>
+            <a:pPr lvl="1"/>
+            <a:r>
+              <a:rPr lang="hr-HR" dirty="0">
+                <a:solidFill>
+                  <a:srgbClr val="FF0000"/>
+                </a:solidFill>
+              </a:rPr>
+              <a:t>[ANDRIJA DOVRŠI OVE ISPOD]</a:t>
+            </a:r>
+          </a:p>
+          <a:p>
+            <a:pPr lvl="1"/>
+            <a:r>
+              <a:rPr lang="hr-HR" dirty="0"/>
+              <a:t>Tuple&lt;Point, Food&gt; </a:t>
+            </a:r>
+            <a:r>
+              <a:rPr lang="hr-HR" dirty="0">
+                <a:solidFill>
+                  <a:srgbClr val="00B0F0"/>
+                </a:solidFill>
+              </a:rPr>
+              <a:t>newFood </a:t>
+            </a:r>
+            <a:endParaRPr lang="hr-HR" dirty="0"/>
+          </a:p>
+          <a:p>
+            <a:pPr lvl="1"/>
+            <a:r>
+              <a:rPr lang="hr-HR" dirty="0"/>
+              <a:t>ulong </a:t>
+            </a:r>
+            <a:r>
+              <a:rPr lang="hr-HR" dirty="0">
+                <a:solidFill>
+                  <a:srgbClr val="00B0F0"/>
+                </a:solidFill>
+              </a:rPr>
+              <a:t>timestamp</a:t>
+            </a:r>
+          </a:p>
+          <a:p>
+            <a:pPr lvl="1"/>
+            <a:r>
+              <a:rPr lang="hr-HR" dirty="0"/>
+              <a:t>Random </a:t>
+            </a:r>
+            <a:r>
+              <a:rPr lang="hr-HR" dirty="0">
+                <a:solidFill>
+                  <a:srgbClr val="00B0F0"/>
+                </a:solidFill>
+              </a:rPr>
+              <a:t>r</a:t>
+            </a:r>
+          </a:p>
+          <a:p>
+            <a:pPr lvl="1"/>
+            <a:r>
+              <a:rPr lang="hr-HR" dirty="0"/>
+              <a:t>List&lt;Point&gt; </a:t>
+            </a:r>
+            <a:r>
+              <a:rPr lang="hr-HR" dirty="0">
+                <a:solidFill>
+                  <a:srgbClr val="00B0F0"/>
+                </a:solidFill>
+              </a:rPr>
+              <a:t>transparentPoints</a:t>
+            </a:r>
+          </a:p>
+          <a:p>
+            <a:pPr lvl="1"/>
+            <a:r>
+              <a:rPr lang="hr-HR" dirty="0"/>
+              <a:t>bool newLevel = </a:t>
+            </a:r>
+            <a:r>
+              <a:rPr lang="hr-HR" dirty="0">
+                <a:solidFill>
+                  <a:srgbClr val="00B0F0"/>
+                </a:solidFill>
+              </a:rPr>
+              <a:t>false</a:t>
+            </a:r>
+          </a:p>
+          <a:p>
+            <a:pPr lvl="1"/>
+            <a:r>
+              <a:rPr lang="hr-HR" dirty="0"/>
+              <a:t>public int </a:t>
+            </a:r>
+            <a:r>
+              <a:rPr lang="hr-HR" dirty="0">
+                <a:solidFill>
+                  <a:srgbClr val="00B0F0"/>
+                </a:solidFill>
+              </a:rPr>
+              <a:t>randomTimeLeft </a:t>
+            </a:r>
+            <a:r>
+              <a:rPr lang="hr-HR" dirty="0"/>
+              <a:t>= 0</a:t>
+            </a:r>
+          </a:p>
+          <a:p>
+            <a:pPr lvl="1"/>
+            <a:r>
+              <a:rPr lang="hr-HR" dirty="0"/>
+              <a:t>public int </a:t>
+            </a:r>
+            <a:r>
+              <a:rPr lang="hr-HR" dirty="0">
+                <a:solidFill>
+                  <a:srgbClr val="00B0F0"/>
+                </a:solidFill>
+              </a:rPr>
+              <a:t>randomMode </a:t>
+            </a:r>
+            <a:r>
+              <a:rPr lang="hr-HR" dirty="0"/>
+              <a:t>= 0</a:t>
+            </a:r>
+          </a:p>
+          <a:p>
+            <a:pPr marL="457200" lvl="1" indent="0">
+              <a:buNone/>
+            </a:pPr>
+            <a:endParaRPr lang="hr-HR" dirty="0"/>
+          </a:p>
+          <a:p>
+            <a:endParaRPr lang="en-US" dirty="0"/>
           </a:p>
         </p:txBody>
       </p:sp>
     </p:spTree>
     <p:extLst>
       <p:ext uri="{BB962C8B-B14F-4D97-AF65-F5344CB8AC3E}">
-        <p14:creationId xmlns:p14="http://schemas.microsoft.com/office/powerpoint/2010/main" val="3286224332"/>
+        <p14:creationId xmlns:p14="http://schemas.microsoft.com/office/powerpoint/2010/main" val="3895275178"/>
       </p:ext>
     </p:extLst>
   </p:cSld>
@@ -3786,7 +4267,7 @@
           <p:cNvPr id="2" name="Title 1">
             <a:extLst>
               <a:ext uri="{FF2B5EF4-FFF2-40B4-BE49-F238E27FC236}">
-                <a16:creationId xmlns:a16="http://schemas.microsoft.com/office/drawing/2014/main" id="{A4329D90-0308-1849-9FB7-22637C69AE80}"/>
+                <a16:creationId xmlns:a16="http://schemas.microsoft.com/office/drawing/2014/main" id="{72DAB73D-586A-3DD7-6754-6C0E5A0B437C}"/>
               </a:ext>
             </a:extLst>
           </p:cNvPr>
@@ -3804,7 +4285,7 @@
           <a:p>
             <a:r>
               <a:rPr lang="hr-HR" dirty="0"/>
-              <a:t>class Food</a:t>
+              <a:t>class Game : GameForm</a:t>
             </a:r>
             <a:endParaRPr lang="en-US" dirty="0"/>
           </a:p>
@@ -3815,7 +4296,7 @@
           <p:cNvPr id="3" name="Content Placeholder 2">
             <a:extLst>
               <a:ext uri="{FF2B5EF4-FFF2-40B4-BE49-F238E27FC236}">
-                <a16:creationId xmlns:a16="http://schemas.microsoft.com/office/drawing/2014/main" id="{ED7F9BDF-46CC-2719-BC36-5AE769BC8A3D}"/>
+                <a16:creationId xmlns:a16="http://schemas.microsoft.com/office/drawing/2014/main" id="{47A4A945-B0C9-EB6E-E9B1-1702BC68F4AD}"/>
               </a:ext>
             </a:extLst>
           </p:cNvPr>
@@ -3826,10 +4307,99 @@
             <p:ph idx="1"/>
           </p:nvPr>
         </p:nvSpPr>
-        <p:spPr/>
-        <p:txBody>
-          <a:bodyPr/>
-          <a:lstStyle/>
+        <p:spPr>
+          <a:xfrm>
+            <a:off x="838200" y="1498600"/>
+            <a:ext cx="10515600" cy="4678363"/>
+          </a:xfrm>
+        </p:spPr>
+        <p:txBody>
+          <a:bodyPr>
+            <a:normAutofit/>
+          </a:bodyPr>
+          <a:lstStyle/>
+          <a:p>
+            <a:pPr lvl="1"/>
+            <a:r>
+              <a:rPr lang="hr-HR" dirty="0"/>
+              <a:t>Keys </a:t>
+            </a:r>
+            <a:r>
+              <a:rPr lang="hr-HR" dirty="0">
+                <a:solidFill>
+                  <a:srgbClr val="00B0F0"/>
+                </a:solidFill>
+              </a:rPr>
+              <a:t>tpEdgeActivator, tpSelfActivator</a:t>
+            </a:r>
+            <a:r>
+              <a:rPr lang="hr-HR" dirty="0"/>
+              <a:t> ... aktivatori za specijalne pokrete</a:t>
+            </a:r>
+          </a:p>
+          <a:p>
+            <a:pPr lvl="1"/>
+            <a:r>
+              <a:rPr lang="hr-HR" dirty="0"/>
+              <a:t>Keys </a:t>
+            </a:r>
+            <a:r>
+              <a:rPr lang="hr-HR" dirty="0">
+                <a:solidFill>
+                  <a:srgbClr val="00B0F0"/>
+                </a:solidFill>
+              </a:rPr>
+              <a:t>up, down, left, right </a:t>
+            </a:r>
+            <a:r>
+              <a:rPr lang="hr-HR" dirty="0"/>
+              <a:t>... generalne kontrole smjera</a:t>
+            </a:r>
+          </a:p>
+          <a:p>
+            <a:pPr lvl="1"/>
+            <a:r>
+              <a:rPr lang="hr-HR" dirty="0"/>
+              <a:t>bool </a:t>
+            </a:r>
+            <a:r>
+              <a:rPr lang="hr-HR" dirty="0">
+                <a:solidFill>
+                  <a:srgbClr val="00B0F0"/>
+                </a:solidFill>
+              </a:rPr>
+              <a:t>tpEdge, skipN, tpSelf </a:t>
+            </a:r>
+            <a:r>
+              <a:rPr lang="hr-HR" dirty="0"/>
+              <a:t>... jesu li kretnje aktivirane posebnim tipkama</a:t>
+            </a:r>
+          </a:p>
+          <a:p>
+            <a:pPr lvl="1"/>
+            <a:r>
+              <a:rPr lang="hr-HR" dirty="0"/>
+              <a:t>int </a:t>
+            </a:r>
+            <a:r>
+              <a:rPr lang="hr-HR" dirty="0">
+                <a:solidFill>
+                  <a:srgbClr val="00B0F0"/>
+                </a:solidFill>
+              </a:rPr>
+              <a:t>skipAmount</a:t>
+            </a:r>
+            <a:r>
+              <a:rPr lang="hr-HR" dirty="0"/>
+              <a:t> ... za koliko zmija mora skočiti</a:t>
+            </a:r>
+          </a:p>
+          <a:p>
+            <a:pPr marL="457200" lvl="1" indent="0">
+              <a:buNone/>
+            </a:pPr>
+            <a:endParaRPr lang="hr-HR" dirty="0"/>
+          </a:p>
           <a:p>
             <a:endParaRPr lang="en-US" dirty="0"/>
           </a:p>
@@ -3838,7 +4408,7 @@
     </p:spTree>
     <p:extLst>
       <p:ext uri="{BB962C8B-B14F-4D97-AF65-F5344CB8AC3E}">
-        <p14:creationId xmlns:p14="http://schemas.microsoft.com/office/powerpoint/2010/main" val="3860765346"/>
+        <p14:creationId xmlns:p14="http://schemas.microsoft.com/office/powerpoint/2010/main" val="1837095722"/>
       </p:ext>
     </p:extLst>
   </p:cSld>
@@ -3870,6 +4440,375 @@
           <p:cNvPr id="2" name="Title 1">
             <a:extLst>
               <a:ext uri="{FF2B5EF4-FFF2-40B4-BE49-F238E27FC236}">
+                <a16:creationId xmlns:a16="http://schemas.microsoft.com/office/drawing/2014/main" id="{72DAB73D-586A-3DD7-6754-6C0E5A0B437C}"/>
+              </a:ext>
+            </a:extLst>
+          </p:cNvPr>
+          <p:cNvSpPr>
+            <a:spLocks noGrp="1"/>
+          </p:cNvSpPr>
+          <p:nvPr>
+            <p:ph type="title"/>
+          </p:nvPr>
+        </p:nvSpPr>
+        <p:spPr/>
+        <p:txBody>
+          <a:bodyPr/>
+          <a:lstStyle/>
+          <a:p>
+            <a:r>
+              <a:rPr lang="hr-HR" dirty="0"/>
+              <a:t>class Game : GameForm</a:t>
+            </a:r>
+            <a:endParaRPr lang="en-US" dirty="0"/>
+          </a:p>
+        </p:txBody>
+      </p:sp>
+      <p:sp>
+        <p:nvSpPr>
+          <p:cNvPr id="3" name="Content Placeholder 2">
+            <a:extLst>
+              <a:ext uri="{FF2B5EF4-FFF2-40B4-BE49-F238E27FC236}">
+                <a16:creationId xmlns:a16="http://schemas.microsoft.com/office/drawing/2014/main" id="{47A4A945-B0C9-EB6E-E9B1-1702BC68F4AD}"/>
+              </a:ext>
+            </a:extLst>
+          </p:cNvPr>
+          <p:cNvSpPr>
+            <a:spLocks noGrp="1"/>
+          </p:cNvSpPr>
+          <p:nvPr>
+            <p:ph idx="1"/>
+          </p:nvPr>
+        </p:nvSpPr>
+        <p:spPr/>
+        <p:txBody>
+          <a:bodyPr/>
+          <a:lstStyle/>
+          <a:p>
+            <a:r>
+              <a:rPr lang="hr-HR" dirty="0"/>
+              <a:t>spomenute metode standarda:</a:t>
+            </a:r>
+          </a:p>
+          <a:p>
+            <a:pPr lvl="1"/>
+            <a:r>
+              <a:rPr lang="hr-HR" dirty="0">
+                <a:solidFill>
+                  <a:srgbClr val="FFC000"/>
+                </a:solidFill>
+              </a:rPr>
+              <a:t>Setup</a:t>
+            </a:r>
+          </a:p>
+          <a:p>
+            <a:pPr lvl="1"/>
+            <a:r>
+              <a:rPr lang="hr-HR" dirty="0">
+                <a:solidFill>
+                  <a:srgbClr val="FFC000"/>
+                </a:solidFill>
+              </a:rPr>
+              <a:t>Draw</a:t>
+            </a:r>
+          </a:p>
+          <a:p>
+            <a:pPr lvl="1"/>
+            <a:r>
+              <a:rPr lang="hr-HR" dirty="0">
+                <a:solidFill>
+                  <a:srgbClr val="FFC000"/>
+                </a:solidFill>
+              </a:rPr>
+              <a:t>KeyPressed</a:t>
+            </a:r>
+          </a:p>
+          <a:p>
+            <a:pPr lvl="1"/>
+            <a:r>
+              <a:rPr lang="hr-HR" dirty="0">
+                <a:solidFill>
+                  <a:srgbClr val="FFC000"/>
+                </a:solidFill>
+              </a:rPr>
+              <a:t>KeyReleased</a:t>
+            </a:r>
+          </a:p>
+          <a:p>
+            <a:endParaRPr lang="en-US" dirty="0"/>
+          </a:p>
+        </p:txBody>
+      </p:sp>
+    </p:spTree>
+    <p:extLst>
+      <p:ext uri="{BB962C8B-B14F-4D97-AF65-F5344CB8AC3E}">
+        <p14:creationId xmlns:p14="http://schemas.microsoft.com/office/powerpoint/2010/main" val="3133891991"/>
+      </p:ext>
+    </p:extLst>
+  </p:cSld>
+  <p:clrMapOvr>
+    <a:masterClrMapping/>
+  </p:clrMapOvr>
+</p:sld>
+</file>
+
+<file path=ppt/slides/slide16.xml><?xml version="1.0" encoding="utf-8"?>
+<p:sld xmlns:a="http://schemas.openxmlformats.org/drawingml/2006/main" xmlns:r="http://schemas.openxmlformats.org/officeDocument/2006/relationships" xmlns:p="http://schemas.openxmlformats.org/presentationml/2006/main">
+  <p:cSld>
+    <p:spTree>
+      <p:nvGrpSpPr>
+        <p:cNvPr id="1" name=""/>
+        <p:cNvGrpSpPr/>
+        <p:nvPr/>
+      </p:nvGrpSpPr>
+      <p:grpSpPr>
+        <a:xfrm>
+          <a:off x="0" y="0"/>
+          <a:ext cx="0" cy="0"/>
+          <a:chOff x="0" y="0"/>
+          <a:chExt cx="0" cy="0"/>
+        </a:xfrm>
+      </p:grpSpPr>
+      <p:sp>
+        <p:nvSpPr>
+          <p:cNvPr id="2" name="Title 1">
+            <a:extLst>
+              <a:ext uri="{FF2B5EF4-FFF2-40B4-BE49-F238E27FC236}">
+                <a16:creationId xmlns:a16="http://schemas.microsoft.com/office/drawing/2014/main" id="{72DAB73D-586A-3DD7-6754-6C0E5A0B437C}"/>
+              </a:ext>
+            </a:extLst>
+          </p:cNvPr>
+          <p:cNvSpPr>
+            <a:spLocks noGrp="1"/>
+          </p:cNvSpPr>
+          <p:nvPr>
+            <p:ph type="title"/>
+          </p:nvPr>
+        </p:nvSpPr>
+        <p:spPr/>
+        <p:txBody>
+          <a:bodyPr/>
+          <a:lstStyle/>
+          <a:p>
+            <a:r>
+              <a:rPr lang="hr-HR" dirty="0"/>
+              <a:t>class Game : GameForm</a:t>
+            </a:r>
+            <a:endParaRPr lang="en-US" dirty="0"/>
+          </a:p>
+        </p:txBody>
+      </p:sp>
+      <p:sp>
+        <p:nvSpPr>
+          <p:cNvPr id="3" name="Content Placeholder 2">
+            <a:extLst>
+              <a:ext uri="{FF2B5EF4-FFF2-40B4-BE49-F238E27FC236}">
+                <a16:creationId xmlns:a16="http://schemas.microsoft.com/office/drawing/2014/main" id="{47A4A945-B0C9-EB6E-E9B1-1702BC68F4AD}"/>
+              </a:ext>
+            </a:extLst>
+          </p:cNvPr>
+          <p:cNvSpPr>
+            <a:spLocks noGrp="1"/>
+          </p:cNvSpPr>
+          <p:nvPr>
+            <p:ph idx="1"/>
+          </p:nvPr>
+        </p:nvSpPr>
+        <p:spPr/>
+        <p:txBody>
+          <a:bodyPr/>
+          <a:lstStyle/>
+          <a:p>
+            <a:r>
+              <a:rPr lang="hr-HR" dirty="0"/>
+              <a:t>metode:</a:t>
+            </a:r>
+          </a:p>
+          <a:p>
+            <a:pPr lvl="1"/>
+            <a:r>
+              <a:rPr lang="hr-HR" dirty="0"/>
+              <a:t>bool </a:t>
+            </a:r>
+            <a:r>
+              <a:rPr lang="hr-HR" dirty="0">
+                <a:solidFill>
+                  <a:srgbClr val="FFC000"/>
+                </a:solidFill>
+              </a:rPr>
+              <a:t>ActivateTP</a:t>
+            </a:r>
+            <a:r>
+              <a:rPr lang="hr-HR" dirty="0"/>
+              <a:t>(Point dir) ... poziva metode za posebne pokrete zmije</a:t>
+            </a:r>
+          </a:p>
+          <a:p>
+            <a:pPr lvl="1"/>
+            <a:r>
+              <a:rPr lang="hr-HR" dirty="0"/>
+              <a:t>void </a:t>
+            </a:r>
+            <a:r>
+              <a:rPr lang="hr-HR" dirty="0">
+                <a:solidFill>
+                  <a:srgbClr val="FFC000"/>
+                </a:solidFill>
+              </a:rPr>
+              <a:t>LevelUp</a:t>
+            </a:r>
+            <a:r>
+              <a:rPr lang="hr-HR" dirty="0"/>
+              <a:t>() ... progresija na nopvi stage, otežanje igre</a:t>
+            </a:r>
+          </a:p>
+          <a:p>
+            <a:pPr lvl="1"/>
+            <a:r>
+              <a:rPr lang="hr-HR" dirty="0">
+                <a:solidFill>
+                  <a:srgbClr val="FF0000"/>
+                </a:solidFill>
+              </a:rPr>
+              <a:t>[ANDRIJA DOVRŠI]</a:t>
+            </a:r>
+            <a:endParaRPr lang="en-US" dirty="0">
+              <a:solidFill>
+                <a:srgbClr val="FF0000"/>
+              </a:solidFill>
+            </a:endParaRPr>
+          </a:p>
+        </p:txBody>
+      </p:sp>
+    </p:spTree>
+    <p:extLst>
+      <p:ext uri="{BB962C8B-B14F-4D97-AF65-F5344CB8AC3E}">
+        <p14:creationId xmlns:p14="http://schemas.microsoft.com/office/powerpoint/2010/main" val="863252821"/>
+      </p:ext>
+    </p:extLst>
+  </p:cSld>
+  <p:clrMapOvr>
+    <a:masterClrMapping/>
+  </p:clrMapOvr>
+</p:sld>
+</file>
+
+<file path=ppt/slides/slide17.xml><?xml version="1.0" encoding="utf-8"?>
+<p:sld xmlns:a="http://schemas.openxmlformats.org/drawingml/2006/main" xmlns:r="http://schemas.openxmlformats.org/officeDocument/2006/relationships" xmlns:p="http://schemas.openxmlformats.org/presentationml/2006/main">
+  <p:cSld>
+    <p:spTree>
+      <p:nvGrpSpPr>
+        <p:cNvPr id="1" name=""/>
+        <p:cNvGrpSpPr/>
+        <p:nvPr/>
+      </p:nvGrpSpPr>
+      <p:grpSpPr>
+        <a:xfrm>
+          <a:off x="0" y="0"/>
+          <a:ext cx="0" cy="0"/>
+          <a:chOff x="0" y="0"/>
+          <a:chExt cx="0" cy="0"/>
+        </a:xfrm>
+      </p:grpSpPr>
+      <p:sp>
+        <p:nvSpPr>
+          <p:cNvPr id="2" name="Title 1">
+            <a:extLst>
+              <a:ext uri="{FF2B5EF4-FFF2-40B4-BE49-F238E27FC236}">
+                <a16:creationId xmlns:a16="http://schemas.microsoft.com/office/drawing/2014/main" id="{568FAC47-4F40-576E-683E-84D1683EE49E}"/>
+              </a:ext>
+            </a:extLst>
+          </p:cNvPr>
+          <p:cNvSpPr>
+            <a:spLocks noGrp="1"/>
+          </p:cNvSpPr>
+          <p:nvPr>
+            <p:ph type="title"/>
+          </p:nvPr>
+        </p:nvSpPr>
+        <p:spPr/>
+        <p:txBody>
+          <a:bodyPr/>
+          <a:lstStyle/>
+          <a:p>
+            <a:r>
+              <a:rPr lang="hr-HR" dirty="0"/>
+              <a:t>class Varijable</a:t>
+            </a:r>
+            <a:endParaRPr lang="en-US" dirty="0"/>
+          </a:p>
+        </p:txBody>
+      </p:sp>
+      <p:sp>
+        <p:nvSpPr>
+          <p:cNvPr id="3" name="Content Placeholder 2">
+            <a:extLst>
+              <a:ext uri="{FF2B5EF4-FFF2-40B4-BE49-F238E27FC236}">
+                <a16:creationId xmlns:a16="http://schemas.microsoft.com/office/drawing/2014/main" id="{FB65E884-F899-1565-7D14-A84FCEFA2AF6}"/>
+              </a:ext>
+            </a:extLst>
+          </p:cNvPr>
+          <p:cNvSpPr>
+            <a:spLocks noGrp="1"/>
+          </p:cNvSpPr>
+          <p:nvPr>
+            <p:ph idx="1"/>
+          </p:nvPr>
+        </p:nvSpPr>
+        <p:spPr/>
+        <p:txBody>
+          <a:bodyPr/>
+          <a:lstStyle/>
+          <a:p>
+            <a:r>
+              <a:rPr lang="hr-HR" dirty="0"/>
+              <a:t>neke istaknute varijable</a:t>
+            </a:r>
+          </a:p>
+          <a:p>
+            <a:r>
+              <a:rPr lang="hr-HR" dirty="0"/>
+              <a:t>svaka instanca Game klase ima istancu od Varijable</a:t>
+            </a:r>
+            <a:endParaRPr lang="en-US" dirty="0"/>
+          </a:p>
+        </p:txBody>
+      </p:sp>
+    </p:spTree>
+    <p:extLst>
+      <p:ext uri="{BB962C8B-B14F-4D97-AF65-F5344CB8AC3E}">
+        <p14:creationId xmlns:p14="http://schemas.microsoft.com/office/powerpoint/2010/main" val="601141755"/>
+      </p:ext>
+    </p:extLst>
+  </p:cSld>
+  <p:clrMapOvr>
+    <a:masterClrMapping/>
+  </p:clrMapOvr>
+</p:sld>
+</file>
+
+<file path=ppt/slides/slide18.xml><?xml version="1.0" encoding="utf-8"?>
+<p:sld xmlns:a="http://schemas.openxmlformats.org/drawingml/2006/main" xmlns:r="http://schemas.openxmlformats.org/officeDocument/2006/relationships" xmlns:p="http://schemas.openxmlformats.org/presentationml/2006/main">
+  <p:cSld>
+    <p:spTree>
+      <p:nvGrpSpPr>
+        <p:cNvPr id="1" name=""/>
+        <p:cNvGrpSpPr/>
+        <p:nvPr/>
+      </p:nvGrpSpPr>
+      <p:grpSpPr>
+        <a:xfrm>
+          <a:off x="0" y="0"/>
+          <a:ext cx="0" cy="0"/>
+          <a:chOff x="0" y="0"/>
+          <a:chExt cx="0" cy="0"/>
+        </a:xfrm>
+      </p:grpSpPr>
+      <p:sp>
+        <p:nvSpPr>
+          <p:cNvPr id="2" name="Title 1">
+            <a:extLst>
+              <a:ext uri="{FF2B5EF4-FFF2-40B4-BE49-F238E27FC236}">
                 <a16:creationId xmlns:a16="http://schemas.microsoft.com/office/drawing/2014/main" id="{24BFB985-0493-6F08-83C4-C90C230C1491}"/>
               </a:ext>
             </a:extLst>
@@ -3915,6 +4854,42 @@
           <a:bodyPr/>
           <a:lstStyle/>
           <a:p>
+            <a:r>
+              <a:rPr lang="hr-HR" dirty="0"/>
+              <a:t>sadrži dizajn stageva pomoću polja </a:t>
+            </a:r>
+            <a:r>
+              <a:rPr lang="hr-HR" dirty="0">
+                <a:solidFill>
+                  <a:srgbClr val="00B050"/>
+                </a:solidFill>
+              </a:rPr>
+              <a:t>stringova</a:t>
+            </a:r>
+          </a:p>
+          <a:p>
+            <a:r>
+              <a:rPr lang="hr-HR" dirty="0"/>
+              <a:t>dekriptira ih i petvara u listu </a:t>
+            </a:r>
+            <a:r>
+              <a:rPr lang="hr-HR" dirty="0">
+                <a:solidFill>
+                  <a:srgbClr val="00B050"/>
+                </a:solidFill>
+              </a:rPr>
+              <a:t>Point</a:t>
+            </a:r>
+            <a:r>
+              <a:rPr lang="hr-HR" dirty="0"/>
+              <a:t> objekata</a:t>
+            </a:r>
+          </a:p>
+          <a:p>
+            <a:r>
+              <a:rPr lang="hr-HR" dirty="0"/>
+              <a:t>lako se dodaju i redizajniraju stagevi</a:t>
+            </a:r>
             <a:endParaRPr lang="en-US" dirty="0"/>
           </a:p>
         </p:txBody>
@@ -3923,6 +4898,102 @@
     <p:extLst>
       <p:ext uri="{BB962C8B-B14F-4D97-AF65-F5344CB8AC3E}">
         <p14:creationId xmlns:p14="http://schemas.microsoft.com/office/powerpoint/2010/main" val="3043306996"/>
+      </p:ext>
+    </p:extLst>
+  </p:cSld>
+  <p:clrMapOvr>
+    <a:masterClrMapping/>
+  </p:clrMapOvr>
+</p:sld>
+</file>
+
+<file path=ppt/slides/slide19.xml><?xml version="1.0" encoding="utf-8"?>
+<p:sld xmlns:a="http://schemas.openxmlformats.org/drawingml/2006/main" xmlns:r="http://schemas.openxmlformats.org/officeDocument/2006/relationships" xmlns:p="http://schemas.openxmlformats.org/presentationml/2006/main">
+  <p:cSld>
+    <p:spTree>
+      <p:nvGrpSpPr>
+        <p:cNvPr id="1" name=""/>
+        <p:cNvGrpSpPr/>
+        <p:nvPr/>
+      </p:nvGrpSpPr>
+      <p:grpSpPr>
+        <a:xfrm>
+          <a:off x="0" y="0"/>
+          <a:ext cx="0" cy="0"/>
+          <a:chOff x="0" y="0"/>
+          <a:chExt cx="0" cy="0"/>
+        </a:xfrm>
+      </p:grpSpPr>
+      <p:sp>
+        <p:nvSpPr>
+          <p:cNvPr id="2" name="Title 1">
+            <a:extLst>
+              <a:ext uri="{FF2B5EF4-FFF2-40B4-BE49-F238E27FC236}">
+                <a16:creationId xmlns:a16="http://schemas.microsoft.com/office/drawing/2014/main" id="{9F96E68C-3376-C114-7ACC-06A7333A4185}"/>
+              </a:ext>
+            </a:extLst>
+          </p:cNvPr>
+          <p:cNvSpPr>
+            <a:spLocks noGrp="1"/>
+          </p:cNvSpPr>
+          <p:nvPr>
+            <p:ph type="title"/>
+          </p:nvPr>
+        </p:nvSpPr>
+        <p:spPr/>
+        <p:txBody>
+          <a:bodyPr/>
+          <a:lstStyle/>
+          <a:p>
+            <a:r>
+              <a:rPr lang="hr-HR" dirty="0"/>
+              <a:t>class Snake</a:t>
+            </a:r>
+            <a:endParaRPr lang="en-US" dirty="0"/>
+          </a:p>
+        </p:txBody>
+      </p:sp>
+      <p:sp>
+        <p:nvSpPr>
+          <p:cNvPr id="3" name="Content Placeholder 2">
+            <a:extLst>
+              <a:ext uri="{FF2B5EF4-FFF2-40B4-BE49-F238E27FC236}">
+                <a16:creationId xmlns:a16="http://schemas.microsoft.com/office/drawing/2014/main" id="{CD12693D-8372-01E1-87A9-C799C86D3EA8}"/>
+              </a:ext>
+            </a:extLst>
+          </p:cNvPr>
+          <p:cNvSpPr>
+            <a:spLocks noGrp="1"/>
+          </p:cNvSpPr>
+          <p:nvPr>
+            <p:ph idx="1"/>
+          </p:nvPr>
+        </p:nvSpPr>
+        <p:spPr/>
+        <p:txBody>
+          <a:bodyPr/>
+          <a:lstStyle/>
+          <a:p>
+            <a:r>
+              <a:rPr lang="hr-HR" dirty="0">
+                <a:solidFill>
+                  <a:srgbClr val="FF0000"/>
+                </a:solidFill>
+              </a:rPr>
+              <a:t>[ANDRIJA DOVRŠI]</a:t>
+            </a:r>
+            <a:endParaRPr lang="en-US" dirty="0">
+              <a:solidFill>
+                <a:srgbClr val="FF0000"/>
+              </a:solidFill>
+            </a:endParaRPr>
+          </a:p>
+        </p:txBody>
+      </p:sp>
+    </p:spTree>
+    <p:extLst>
+      <p:ext uri="{BB962C8B-B14F-4D97-AF65-F5344CB8AC3E}">
+        <p14:creationId xmlns:p14="http://schemas.microsoft.com/office/powerpoint/2010/main" val="3286224332"/>
       </p:ext>
     </p:extLst>
   </p:cSld>
@@ -4007,6 +5078,105 @@
     <p:extLst>
       <p:ext uri="{BB962C8B-B14F-4D97-AF65-F5344CB8AC3E}">
         <p14:creationId xmlns:p14="http://schemas.microsoft.com/office/powerpoint/2010/main" val="3136975644"/>
+      </p:ext>
+    </p:extLst>
+  </p:cSld>
+  <p:clrMapOvr>
+    <a:masterClrMapping/>
+  </p:clrMapOvr>
+</p:sld>
+</file>
+
+<file path=ppt/slides/slide20.xml><?xml version="1.0" encoding="utf-8"?>
+<p:sld xmlns:a="http://schemas.openxmlformats.org/drawingml/2006/main" xmlns:r="http://schemas.openxmlformats.org/officeDocument/2006/relationships" xmlns:p="http://schemas.openxmlformats.org/presentationml/2006/main">
+  <p:cSld>
+    <p:spTree>
+      <p:nvGrpSpPr>
+        <p:cNvPr id="1" name=""/>
+        <p:cNvGrpSpPr/>
+        <p:nvPr/>
+      </p:nvGrpSpPr>
+      <p:grpSpPr>
+        <a:xfrm>
+          <a:off x="0" y="0"/>
+          <a:ext cx="0" cy="0"/>
+          <a:chOff x="0" y="0"/>
+          <a:chExt cx="0" cy="0"/>
+        </a:xfrm>
+      </p:grpSpPr>
+      <p:sp>
+        <p:nvSpPr>
+          <p:cNvPr id="2" name="Title 1">
+            <a:extLst>
+              <a:ext uri="{FF2B5EF4-FFF2-40B4-BE49-F238E27FC236}">
+                <a16:creationId xmlns:a16="http://schemas.microsoft.com/office/drawing/2014/main" id="{8840140E-345D-241A-EF5D-581A6EBC06D9}"/>
+              </a:ext>
+            </a:extLst>
+          </p:cNvPr>
+          <p:cNvSpPr>
+            <a:spLocks noGrp="1"/>
+          </p:cNvSpPr>
+          <p:nvPr>
+            <p:ph type="title"/>
+          </p:nvPr>
+        </p:nvSpPr>
+        <p:spPr/>
+        <p:txBody>
+          <a:bodyPr/>
+          <a:lstStyle/>
+          <a:p>
+            <a:r>
+              <a:rPr lang="hr-HR" dirty="0"/>
+              <a:t>class SnakeAI</a:t>
+            </a:r>
+            <a:endParaRPr lang="en-US" dirty="0"/>
+          </a:p>
+        </p:txBody>
+      </p:sp>
+      <p:sp>
+        <p:nvSpPr>
+          <p:cNvPr id="3" name="Content Placeholder 2">
+            <a:extLst>
+              <a:ext uri="{FF2B5EF4-FFF2-40B4-BE49-F238E27FC236}">
+                <a16:creationId xmlns:a16="http://schemas.microsoft.com/office/drawing/2014/main" id="{49573DEA-6FD7-178C-BCA0-6CCC2E23D7BF}"/>
+              </a:ext>
+            </a:extLst>
+          </p:cNvPr>
+          <p:cNvSpPr>
+            <a:spLocks noGrp="1"/>
+          </p:cNvSpPr>
+          <p:nvPr>
+            <p:ph idx="1"/>
+          </p:nvPr>
+        </p:nvSpPr>
+        <p:spPr/>
+        <p:txBody>
+          <a:bodyPr/>
+          <a:lstStyle/>
+          <a:p>
+            <a:r>
+              <a:rPr lang="hr-HR" dirty="0">
+                <a:solidFill>
+                  <a:srgbClr val="FF0000"/>
+                </a:solidFill>
+              </a:rPr>
+              <a:t>[ANDRIJA DOVRŠI]</a:t>
+            </a:r>
+            <a:endParaRPr lang="en-US" dirty="0">
+              <a:solidFill>
+                <a:srgbClr val="FF0000"/>
+              </a:solidFill>
+            </a:endParaRPr>
+          </a:p>
+          <a:p>
+            <a:endParaRPr lang="en-US" dirty="0"/>
+          </a:p>
+        </p:txBody>
+      </p:sp>
+    </p:spTree>
+    <p:extLst>
+      <p:ext uri="{BB962C8B-B14F-4D97-AF65-F5344CB8AC3E}">
+        <p14:creationId xmlns:p14="http://schemas.microsoft.com/office/powerpoint/2010/main" val="3324375871"/>
       </p:ext>
     </p:extLst>
   </p:cSld>
@@ -4381,7 +5551,7 @@
           <p:cNvPr id="2" name="Title 1">
             <a:extLst>
               <a:ext uri="{FF2B5EF4-FFF2-40B4-BE49-F238E27FC236}">
-                <a16:creationId xmlns:a16="http://schemas.microsoft.com/office/drawing/2014/main" id="{F566D8BD-048C-3EC1-2A83-BCAA342206B4}"/>
+                <a16:creationId xmlns:a16="http://schemas.microsoft.com/office/drawing/2014/main" id="{BDB2DBE4-CEA6-352E-CD5D-7FB50581279C}"/>
               </a:ext>
             </a:extLst>
           </p:cNvPr>
@@ -4399,7 +5569,7 @@
           <a:p>
             <a:r>
               <a:rPr lang="hr-HR" dirty="0"/>
-              <a:t>Igra</a:t>
+              <a:t>Igra Versus AI</a:t>
             </a:r>
             <a:endParaRPr lang="en-US" dirty="0"/>
           </a:p>
@@ -4410,7 +5580,7 @@
           <p:cNvPr id="3" name="Content Placeholder 2">
             <a:extLst>
               <a:ext uri="{FF2B5EF4-FFF2-40B4-BE49-F238E27FC236}">
-                <a16:creationId xmlns:a16="http://schemas.microsoft.com/office/drawing/2014/main" id="{1D70A500-ED0B-8385-5787-9DF1182CE83A}"/>
+                <a16:creationId xmlns:a16="http://schemas.microsoft.com/office/drawing/2014/main" id="{3192FA26-770E-DA9A-BB43-68149731A39E}"/>
               </a:ext>
             </a:extLst>
           </p:cNvPr>
@@ -4421,56 +5591,36 @@
             <p:ph idx="1"/>
           </p:nvPr>
         </p:nvSpPr>
-        <p:spPr/>
-        <p:txBody>
-          <a:bodyPr/>
-          <a:lstStyle/>
-          <a:p>
-            <a:r>
-              <a:rPr lang="hr-HR" dirty="0"/>
-              <a:t>Help screen</a:t>
-            </a:r>
-          </a:p>
-          <a:p>
-            <a:pPr lvl="1"/>
-            <a:r>
-              <a:rPr lang="hr-HR" dirty="0"/>
-              <a:t>pravila igre</a:t>
-            </a:r>
-          </a:p>
-          <a:p>
-            <a:r>
-              <a:rPr lang="hr-HR" dirty="0"/>
-              <a:t>Options screen</a:t>
-            </a:r>
-          </a:p>
-          <a:p>
-            <a:pPr lvl="1"/>
-            <a:r>
-              <a:rPr lang="hr-HR" dirty="0"/>
-              <a:t>promjena postavki za kontrole</a:t>
-            </a:r>
-          </a:p>
-          <a:p>
-            <a:r>
-              <a:rPr lang="hr-HR" dirty="0"/>
-              <a:t>Pause screen</a:t>
-            </a:r>
-          </a:p>
-          <a:p>
-            <a:pPr lvl="1"/>
-            <a:r>
-              <a:rPr lang="hr-HR" dirty="0"/>
-              <a:t>tijekom igre promjena postavki i pravila igre</a:t>
-            </a:r>
-            <a:endParaRPr lang="en-US" dirty="0"/>
+        <p:spPr>
+          <a:xfrm>
+            <a:off x="838200" y="1825625"/>
+            <a:ext cx="10515600" cy="4667250"/>
+          </a:xfrm>
+        </p:spPr>
+        <p:txBody>
+          <a:bodyPr/>
+          <a:lstStyle/>
+          <a:p>
+            <a:r>
+              <a:rPr lang="hr-HR" dirty="0">
+                <a:solidFill>
+                  <a:srgbClr val="FF0000"/>
+                </a:solidFill>
+              </a:rPr>
+              <a:t>[ANDRIJA DOVRŠI]</a:t>
+            </a:r>
+            <a:endParaRPr lang="en-US" dirty="0">
+              <a:solidFill>
+                <a:srgbClr val="FF0000"/>
+              </a:solidFill>
+            </a:endParaRPr>
           </a:p>
         </p:txBody>
       </p:sp>
     </p:spTree>
     <p:extLst>
       <p:ext uri="{BB962C8B-B14F-4D97-AF65-F5344CB8AC3E}">
-        <p14:creationId xmlns:p14="http://schemas.microsoft.com/office/powerpoint/2010/main" val="688467632"/>
+        <p14:creationId xmlns:p14="http://schemas.microsoft.com/office/powerpoint/2010/main" val="1668444850"/>
       </p:ext>
     </p:extLst>
   </p:cSld>
@@ -4502,7 +5652,7 @@
           <p:cNvPr id="2" name="Title 1">
             <a:extLst>
               <a:ext uri="{FF2B5EF4-FFF2-40B4-BE49-F238E27FC236}">
-                <a16:creationId xmlns:a16="http://schemas.microsoft.com/office/drawing/2014/main" id="{97E4ACCD-E9D5-B4FD-5D34-E0539B6A5D1D}"/>
+                <a16:creationId xmlns:a16="http://schemas.microsoft.com/office/drawing/2014/main" id="{F566D8BD-048C-3EC1-2A83-BCAA342206B4}"/>
               </a:ext>
             </a:extLst>
           </p:cNvPr>
@@ -4520,7 +5670,7 @@
           <a:p>
             <a:r>
               <a:rPr lang="hr-HR" dirty="0"/>
-              <a:t>Organizacija koda</a:t>
+              <a:t>Dodatne forme</a:t>
             </a:r>
             <a:endParaRPr lang="en-US" dirty="0"/>
           </a:p>
@@ -4528,33 +5678,116 @@
       </p:sp>
       <p:sp>
         <p:nvSpPr>
-          <p:cNvPr id="3" name="Text Placeholder 2">
-            <a:extLst>
-              <a:ext uri="{FF2B5EF4-FFF2-40B4-BE49-F238E27FC236}">
-                <a16:creationId xmlns:a16="http://schemas.microsoft.com/office/drawing/2014/main" id="{E1B0CE17-80BE-9291-3A1F-36F2766A9C7F}"/>
-              </a:ext>
-            </a:extLst>
-          </p:cNvPr>
-          <p:cNvSpPr>
-            <a:spLocks noGrp="1"/>
-          </p:cNvSpPr>
-          <p:nvPr>
-            <p:ph type="body" idx="1"/>
-          </p:nvPr>
-        </p:nvSpPr>
-        <p:spPr/>
-        <p:txBody>
-          <a:bodyPr/>
-          <a:lstStyle/>
-          <a:p>
-            <a:endParaRPr lang="en-US"/>
+          <p:cNvPr id="3" name="Content Placeholder 2">
+            <a:extLst>
+              <a:ext uri="{FF2B5EF4-FFF2-40B4-BE49-F238E27FC236}">
+                <a16:creationId xmlns:a16="http://schemas.microsoft.com/office/drawing/2014/main" id="{1D70A500-ED0B-8385-5787-9DF1182CE83A}"/>
+              </a:ext>
+            </a:extLst>
+          </p:cNvPr>
+          <p:cNvSpPr>
+            <a:spLocks noGrp="1"/>
+          </p:cNvSpPr>
+          <p:nvPr>
+            <p:ph idx="1"/>
+          </p:nvPr>
+        </p:nvSpPr>
+        <p:spPr>
+          <a:xfrm>
+            <a:off x="838200" y="1825625"/>
+            <a:ext cx="10515600" cy="4667250"/>
+          </a:xfrm>
+        </p:spPr>
+        <p:txBody>
+          <a:bodyPr>
+            <a:normAutofit fontScale="92500" lnSpcReduction="10000"/>
+          </a:bodyPr>
+          <a:lstStyle/>
+          <a:p>
+            <a:r>
+              <a:rPr lang="hr-HR" dirty="0"/>
+              <a:t>MainMenu</a:t>
+            </a:r>
+          </a:p>
+          <a:p>
+            <a:pPr lvl="1"/>
+            <a:r>
+              <a:rPr lang="hr-HR" dirty="0"/>
+              <a:t>prva prikazana forma prilikom pokretanja igre</a:t>
+            </a:r>
+          </a:p>
+          <a:p>
+            <a:r>
+              <a:rPr lang="hr-HR" dirty="0"/>
+              <a:t>HelpScreen</a:t>
+            </a:r>
+          </a:p>
+          <a:p>
+            <a:pPr lvl="1"/>
+            <a:r>
+              <a:rPr lang="hr-HR" dirty="0"/>
+              <a:t>pravila igre</a:t>
+            </a:r>
+          </a:p>
+          <a:p>
+            <a:pPr lvl="1"/>
+            <a:r>
+              <a:rPr lang="hr-HR" dirty="0"/>
+              <a:t>prikazuje se kad se igra pauzira</a:t>
+            </a:r>
+          </a:p>
+          <a:p>
+            <a:pPr lvl="1"/>
+            <a:r>
+              <a:rPr lang="hr-HR" dirty="0"/>
+              <a:t>može se doći iz MainMenu</a:t>
+            </a:r>
+          </a:p>
+          <a:p>
+            <a:r>
+              <a:rPr lang="hr-HR" dirty="0"/>
+              <a:t>OptionsScreen</a:t>
+            </a:r>
+          </a:p>
+          <a:p>
+            <a:pPr lvl="1"/>
+            <a:r>
+              <a:rPr lang="hr-HR" dirty="0"/>
+              <a:t>promjena postavki za kontrole</a:t>
+            </a:r>
+          </a:p>
+          <a:p>
+            <a:r>
+              <a:rPr lang="hr-HR" dirty="0"/>
+              <a:t>GameOverForm</a:t>
+            </a:r>
+          </a:p>
+          <a:p>
+            <a:pPr lvl="1"/>
+            <a:r>
+              <a:rPr lang="hr-HR" dirty="0"/>
+              <a:t>prikazuje score</a:t>
+            </a:r>
+          </a:p>
+          <a:p>
+            <a:r>
+              <a:rPr lang="hr-HR" dirty="0"/>
+              <a:t>ControlsChange</a:t>
+            </a:r>
+          </a:p>
+          <a:p>
+            <a:pPr lvl="1"/>
+            <a:r>
+              <a:rPr lang="hr-HR" dirty="0"/>
+              <a:t>prompt za mijenjanje kontrola</a:t>
+            </a:r>
           </a:p>
         </p:txBody>
       </p:sp>
     </p:spTree>
     <p:extLst>
       <p:ext uri="{BB962C8B-B14F-4D97-AF65-F5344CB8AC3E}">
-        <p14:creationId xmlns:p14="http://schemas.microsoft.com/office/powerpoint/2010/main" val="3901350181"/>
+        <p14:creationId xmlns:p14="http://schemas.microsoft.com/office/powerpoint/2010/main" val="688467632"/>
       </p:ext>
     </p:extLst>
   </p:cSld>
@@ -4586,7 +5819,7 @@
           <p:cNvPr id="2" name="Title 1">
             <a:extLst>
               <a:ext uri="{FF2B5EF4-FFF2-40B4-BE49-F238E27FC236}">
-                <a16:creationId xmlns:a16="http://schemas.microsoft.com/office/drawing/2014/main" id="{72DAB73D-586A-3DD7-6754-6C0E5A0B437C}"/>
+                <a16:creationId xmlns:a16="http://schemas.microsoft.com/office/drawing/2014/main" id="{97E4ACCD-E9D5-B4FD-5D34-E0539B6A5D1D}"/>
               </a:ext>
             </a:extLst>
           </p:cNvPr>
@@ -4604,7 +5837,7 @@
           <a:p>
             <a:r>
               <a:rPr lang="hr-HR" dirty="0"/>
-              <a:t>class GameForm : Form</a:t>
+              <a:t>Organizacija koda</a:t>
             </a:r>
             <a:endParaRPr lang="en-US" dirty="0"/>
           </a:p>
@@ -4612,201 +5845,33 @@
       </p:sp>
       <p:sp>
         <p:nvSpPr>
-          <p:cNvPr id="3" name="Content Placeholder 2">
-            <a:extLst>
-              <a:ext uri="{FF2B5EF4-FFF2-40B4-BE49-F238E27FC236}">
-                <a16:creationId xmlns:a16="http://schemas.microsoft.com/office/drawing/2014/main" id="{47A4A945-B0C9-EB6E-E9B1-1702BC68F4AD}"/>
-              </a:ext>
-            </a:extLst>
-          </p:cNvPr>
-          <p:cNvSpPr>
-            <a:spLocks noGrp="1"/>
-          </p:cNvSpPr>
-          <p:nvPr>
-            <p:ph idx="1"/>
-          </p:nvPr>
-        </p:nvSpPr>
-        <p:spPr/>
-        <p:txBody>
-          <a:bodyPr/>
-          <a:lstStyle/>
-          <a:p>
-            <a:r>
-              <a:rPr lang="hr-HR" dirty="0"/>
-              <a:t>skriva implementacije prikaza ekrana i sheme igrice</a:t>
-            </a:r>
-          </a:p>
-          <a:p>
-            <a:r>
-              <a:rPr lang="hr-HR" dirty="0"/>
-              <a:t>članovi:</a:t>
-            </a:r>
-          </a:p>
-          <a:p>
-            <a:pPr lvl="1"/>
-            <a:r>
-              <a:rPr lang="hr-HR" dirty="0"/>
-              <a:t>Keys </a:t>
-            </a:r>
-            <a:r>
-              <a:rPr lang="hr-HR" dirty="0">
-                <a:solidFill>
-                  <a:srgbClr val="00B0F0"/>
-                </a:solidFill>
-              </a:rPr>
-              <a:t>KeyCode</a:t>
-            </a:r>
-            <a:r>
-              <a:rPr lang="hr-HR" dirty="0"/>
-              <a:t> ... kod pritisnute tipke dodijeljene u KeyPressed</a:t>
-            </a:r>
-          </a:p>
-          <a:p>
-            <a:pPr lvl="1"/>
-            <a:r>
-              <a:rPr lang="hr-HR" dirty="0">
-                <a:solidFill>
-                  <a:srgbClr val="00B050"/>
-                </a:solidFill>
-              </a:rPr>
-              <a:t>Varijable</a:t>
-            </a:r>
-            <a:r>
-              <a:rPr lang="hr-HR" dirty="0"/>
-              <a:t> </a:t>
-            </a:r>
-            <a:r>
-              <a:rPr lang="hr-HR" dirty="0">
-                <a:solidFill>
-                  <a:srgbClr val="00B0F0"/>
-                </a:solidFill>
-              </a:rPr>
-              <a:t>varjable </a:t>
-            </a:r>
-            <a:r>
-              <a:rPr lang="hr-HR" dirty="0">
-                <a:solidFill>
-                  <a:schemeClr val="bg1">
-                    <a:lumMod val="50000"/>
-                  </a:schemeClr>
-                </a:solidFill>
-              </a:rPr>
-              <a:t>... (na prezentaciji)</a:t>
-            </a:r>
-            <a:endParaRPr lang="hr-HR" dirty="0">
-              <a:solidFill>
-                <a:srgbClr val="00B0F0"/>
-              </a:solidFill>
-            </a:endParaRPr>
-          </a:p>
-          <a:p>
-            <a:pPr lvl="1"/>
-            <a:r>
-              <a:rPr lang="hr-HR" dirty="0"/>
-              <a:t>TableLayoutPanel </a:t>
-            </a:r>
-            <a:r>
-              <a:rPr lang="hr-HR" dirty="0">
-                <a:solidFill>
-                  <a:srgbClr val="00B0F0"/>
-                </a:solidFill>
-              </a:rPr>
-              <a:t>activeScreen</a:t>
-            </a:r>
-            <a:r>
-              <a:rPr lang="hr-HR" dirty="0"/>
-              <a:t> ... referenca na aktivan TableLayoutPanel</a:t>
-            </a:r>
-          </a:p>
-          <a:p>
-            <a:pPr lvl="1"/>
-            <a:r>
-              <a:rPr lang="hr-HR" dirty="0"/>
-              <a:t>Dictionary&lt;int, TableLayoutPanel&gt; </a:t>
-            </a:r>
-            <a:r>
-              <a:rPr lang="hr-HR" dirty="0">
-                <a:solidFill>
-                  <a:srgbClr val="00B0F0"/>
-                </a:solidFill>
-              </a:rPr>
-              <a:t>screens</a:t>
-            </a:r>
-            <a:r>
-              <a:rPr lang="hr-HR" dirty="0"/>
-              <a:t> ... lista svih inicjaliziranih T.L.Panela</a:t>
-            </a:r>
-          </a:p>
-          <a:p>
-            <a:pPr lvl="1"/>
-            <a:endParaRPr lang="hr-HR" dirty="0"/>
-          </a:p>
-          <a:p>
-            <a:pPr lvl="1"/>
-            <a:r>
-              <a:rPr lang="hr-HR" dirty="0"/>
-              <a:t>virtual void </a:t>
-            </a:r>
-            <a:r>
-              <a:rPr lang="hr-HR" dirty="0">
-                <a:solidFill>
-                  <a:srgbClr val="FFC000"/>
-                </a:solidFill>
-              </a:rPr>
-              <a:t>Setup</a:t>
-            </a:r>
-            <a:r>
-              <a:rPr lang="hr-HR" dirty="0"/>
-              <a:t>() ... shema igrica, prva funkcija</a:t>
-            </a:r>
-          </a:p>
-          <a:p>
-            <a:pPr lvl="1"/>
-            <a:r>
-              <a:rPr lang="hr-HR" dirty="0"/>
-              <a:t>virtual void </a:t>
-            </a:r>
-            <a:r>
-              <a:rPr lang="hr-HR" dirty="0">
-                <a:solidFill>
-                  <a:srgbClr val="FFC000"/>
-                </a:solidFill>
-              </a:rPr>
-              <a:t>Draw</a:t>
-            </a:r>
-            <a:r>
-              <a:rPr lang="hr-HR" dirty="0"/>
-              <a:t>() ... shema igrica, svaki frame se poziva</a:t>
-            </a:r>
-          </a:p>
-          <a:p>
-            <a:pPr lvl="1"/>
-            <a:r>
-              <a:rPr lang="hr-HR" dirty="0"/>
-              <a:t>virtual void </a:t>
-            </a:r>
-            <a:r>
-              <a:rPr lang="hr-HR" dirty="0">
-                <a:solidFill>
-                  <a:srgbClr val="FFC000"/>
-                </a:solidFill>
-              </a:rPr>
-              <a:t>KeyPressed</a:t>
-            </a:r>
-            <a:r>
-              <a:rPr lang="hr-HR" dirty="0"/>
-              <a:t>() ... shema igrica, poziv pritiskom na tipku</a:t>
-            </a:r>
-          </a:p>
-          <a:p>
-            <a:endParaRPr lang="en-US" dirty="0"/>
+          <p:cNvPr id="3" name="Text Placeholder 2">
+            <a:extLst>
+              <a:ext uri="{FF2B5EF4-FFF2-40B4-BE49-F238E27FC236}">
+                <a16:creationId xmlns:a16="http://schemas.microsoft.com/office/drawing/2014/main" id="{E1B0CE17-80BE-9291-3A1F-36F2766A9C7F}"/>
+              </a:ext>
+            </a:extLst>
+          </p:cNvPr>
+          <p:cNvSpPr>
+            <a:spLocks noGrp="1"/>
+          </p:cNvSpPr>
+          <p:nvPr>
+            <p:ph type="body" idx="1"/>
+          </p:nvPr>
+        </p:nvSpPr>
+        <p:spPr/>
+        <p:txBody>
+          <a:bodyPr/>
+          <a:lstStyle/>
+          <a:p>
+            <a:endParaRPr lang="en-US"/>
           </a:p>
         </p:txBody>
       </p:sp>
     </p:spTree>
     <p:extLst>
       <p:ext uri="{BB962C8B-B14F-4D97-AF65-F5344CB8AC3E}">
-        <p14:creationId xmlns:p14="http://schemas.microsoft.com/office/powerpoint/2010/main" val="2247568368"/>
+        <p14:creationId xmlns:p14="http://schemas.microsoft.com/office/powerpoint/2010/main" val="3901350181"/>
       </p:ext>
     </p:extLst>
   </p:cSld>
@@ -4883,22 +5948,57 @@
           <a:bodyPr/>
           <a:lstStyle/>
           <a:p>
+            <a:r>
+              <a:rPr lang="hr-HR" dirty="0"/>
+              <a:t>skriva implementacije prikaza ekrana i sheme igrice</a:t>
+            </a:r>
+          </a:p>
+          <a:p>
+            <a:r>
+              <a:rPr lang="hr-HR" dirty="0"/>
+              <a:t>članovi:</a:t>
+            </a:r>
+          </a:p>
+          <a:p>
             <a:pPr lvl="1"/>
             <a:r>
               <a:rPr lang="hr-HR" dirty="0"/>
-              <a:t>void </a:t>
+              <a:t>Keys </a:t>
             </a:r>
             <a:r>
               <a:rPr lang="hr-HR" dirty="0">
                 <a:solidFill>
-                  <a:srgbClr val="FFC000"/>
+                  <a:srgbClr val="00B0F0"/>
                 </a:solidFill>
               </a:rPr>
-              <a:t>InitializeScreen</a:t>
-            </a:r>
-            <a:r>
-              <a:rPr lang="hr-HR" dirty="0"/>
-              <a:t>( int width ) ... </a:t>
+              <a:t>KeyCode</a:t>
+            </a:r>
+            <a:r>
+              <a:rPr lang="hr-HR" dirty="0"/>
+              <a:t> ... kod pritisnute tipke dodijeljene u KeyPressed</a:t>
+            </a:r>
+          </a:p>
+          <a:p>
+            <a:pPr lvl="1"/>
+            <a:r>
+              <a:rPr lang="hr-HR" dirty="0">
+                <a:solidFill>
+                  <a:srgbClr val="00B050"/>
+                </a:solidFill>
+              </a:rPr>
+              <a:t>Varijable</a:t>
+            </a:r>
+            <a:r>
+              <a:rPr lang="hr-HR" dirty="0"/>
+              <a:t> </a:t>
+            </a:r>
+            <a:r>
+              <a:rPr lang="hr-HR" dirty="0">
+                <a:solidFill>
+                  <a:srgbClr val="00B0F0"/>
+                </a:solidFill>
+              </a:rPr>
+              <a:t>varjable </a:t>
             </a:r>
             <a:r>
               <a:rPr lang="hr-HR" dirty="0">
@@ -4908,86 +6008,50 @@
                   </a:schemeClr>
                 </a:solidFill>
               </a:rPr>
-              <a:t>(na prezentaciji)</a:t>
-            </a:r>
+              <a:t>... (na prezentaciji)</a:t>
+            </a:r>
+            <a:endParaRPr lang="hr-HR" dirty="0">
+              <a:solidFill>
+                <a:srgbClr val="00B0F0"/>
+              </a:solidFill>
+            </a:endParaRPr>
           </a:p>
           <a:p>
             <a:pPr lvl="1"/>
             <a:r>
               <a:rPr lang="hr-HR" dirty="0"/>
-              <a:t>void </a:t>
+              <a:t>TableLayoutPanel </a:t>
             </a:r>
             <a:r>
               <a:rPr lang="hr-HR" dirty="0">
                 <a:solidFill>
-                  <a:srgbClr val="FFC000"/>
+                  <a:srgbClr val="00B0F0"/>
                 </a:solidFill>
               </a:rPr>
-              <a:t>GetScreen</a:t>
-            </a:r>
-            <a:r>
-              <a:rPr lang="hr-HR" dirty="0"/>
-              <a:t>( int width ) ... </a:t>
+              <a:t>activeScreen</a:t>
+            </a:r>
+            <a:r>
+              <a:rPr lang="hr-HR" dirty="0"/>
+              <a:t> ... referenca na aktivan TableLayoutPanel</a:t>
+            </a:r>
+          </a:p>
+          <a:p>
+            <a:pPr lvl="1"/>
+            <a:r>
+              <a:rPr lang="hr-HR" dirty="0"/>
+              <a:t>Dictionary&lt;int, TableLayoutPanel&gt; </a:t>
             </a:r>
             <a:r>
               <a:rPr lang="hr-HR" dirty="0">
                 <a:solidFill>
-                  <a:schemeClr val="bg1">
-                    <a:lumMod val="50000"/>
-                  </a:schemeClr>
+                  <a:srgbClr val="00B0F0"/>
                 </a:solidFill>
               </a:rPr>
-              <a:t>(na prezentaciji)</a:t>
-            </a:r>
-          </a:p>
-          <a:p>
-            <a:pPr lvl="1"/>
-            <a:r>
-              <a:rPr lang="hr-HR" dirty="0"/>
-              <a:t>void </a:t>
-            </a:r>
-            <a:r>
-              <a:rPr lang="hr-HR" dirty="0">
-                <a:solidFill>
-                  <a:srgbClr val="FFC000"/>
-                </a:solidFill>
-              </a:rPr>
-              <a:t>ClearScreen</a:t>
-            </a:r>
-            <a:r>
-              <a:rPr lang="hr-HR" dirty="0"/>
-              <a:t>() ... postavlja pozadinu na crnu, shema igrica</a:t>
-            </a:r>
-          </a:p>
-          <a:p>
-            <a:pPr lvl="1"/>
-            <a:r>
-              <a:rPr lang="hr-HR" dirty="0"/>
-              <a:t>void </a:t>
-            </a:r>
-            <a:r>
-              <a:rPr lang="hr-HR" dirty="0">
-                <a:solidFill>
-                  <a:srgbClr val="FFC000"/>
-                </a:solidFill>
-              </a:rPr>
-              <a:t>DrawList</a:t>
-            </a:r>
-            <a:r>
-              <a:rPr lang="hr-HR" dirty="0"/>
-              <a:t>( </a:t>
-            </a:r>
-            <a:r>
-              <a:rPr lang="en-US" dirty="0"/>
-              <a:t>List&lt;Point&gt; pts, Color </a:t>
-            </a:r>
-            <a:r>
-              <a:rPr lang="en-US" noProof="1"/>
-              <a:t>color</a:t>
-            </a:r>
-            <a:r>
-              <a:rPr lang="hr-HR" dirty="0"/>
-              <a:t> ) ... crta kvadratiće iz pts u boji</a:t>
+              <a:t>screens</a:t>
+            </a:r>
+            <a:r>
+              <a:rPr lang="hr-HR" dirty="0"/>
+              <a:t> ... lista svih inicjaliziranih T.L.Panela</a:t>
             </a:r>
           </a:p>
           <a:p>
@@ -4997,35 +6061,27 @@
           <a:p>
             <a:pPr lvl="1"/>
             <a:r>
+              <a:rPr lang="hr-HR" dirty="0"/>
+              <a:t>virtual void </a:t>
+            </a:r>
+            <a:r>
               <a:rPr lang="hr-HR" dirty="0">
                 <a:solidFill>
                   <a:srgbClr val="FFC000"/>
                 </a:solidFill>
               </a:rPr>
-              <a:t>GameForm</a:t>
-            </a:r>
-            <a:r>
-              <a:rPr lang="hr-HR" dirty="0"/>
-              <a:t>() ... tajmer pokreće</a:t>
+              <a:t>Setup</a:t>
+            </a:r>
+            <a:r>
+              <a:rPr lang="hr-HR" dirty="0"/>
+              <a:t>() ... shema igrica, prva funkcija</a:t>
             </a:r>
           </a:p>
           <a:p>
             <a:pPr lvl="1"/>
             <a:r>
               <a:rPr lang="hr-HR" dirty="0"/>
-              <a:t>void </a:t>
-            </a:r>
-            <a:r>
-              <a:rPr lang="hr-HR" dirty="0">
-                <a:solidFill>
-                  <a:srgbClr val="FFC000"/>
-                </a:solidFill>
-              </a:rPr>
-              <a:t>Timer1_Tick</a:t>
-            </a:r>
-            <a:r>
-              <a:rPr lang="hr-HR" dirty="0"/>
-              <a:t>( object sender, EventArgs e ) ... poziva </a:t>
+              <a:t>virtual void </a:t>
             </a:r>
             <a:r>
               <a:rPr lang="hr-HR" dirty="0">
@@ -5037,119 +6093,29 @@
             </a:r>
             <a:r>
               <a:rPr lang="hr-HR" dirty="0"/>
-              <a:t>()</a:t>
+              <a:t>() ... shema igrica, svaki frame se poziva</a:t>
             </a:r>
           </a:p>
           <a:p>
             <a:pPr lvl="1"/>
             <a:r>
-              <a:rPr lang="en-US" dirty="0"/>
-              <a:t>void </a:t>
-            </a:r>
-            <a:r>
-              <a:rPr lang="en-US" dirty="0">
+              <a:rPr lang="hr-HR" dirty="0"/>
+              <a:t>virtual void </a:t>
+            </a:r>
+            <a:r>
+              <a:rPr lang="hr-HR" dirty="0">
                 <a:solidFill>
                   <a:srgbClr val="FFC000"/>
                 </a:solidFill>
               </a:rPr>
-              <a:t>Form2_Load</a:t>
-            </a:r>
-            <a:r>
-              <a:rPr lang="en-US" dirty="0"/>
-              <a:t>(</a:t>
-            </a:r>
-            <a:r>
-              <a:rPr lang="hr-HR" dirty="0"/>
-              <a:t> </a:t>
-            </a:r>
-            <a:r>
-              <a:rPr lang="en-US" dirty="0"/>
-              <a:t>object sender, </a:t>
-            </a:r>
-            <a:r>
-              <a:rPr lang="en-US" noProof="1"/>
-              <a:t>EventArgs</a:t>
-            </a:r>
-            <a:r>
-              <a:rPr lang="en-US" dirty="0"/>
-              <a:t> e</a:t>
-            </a:r>
-            <a:r>
-              <a:rPr lang="hr-HR" dirty="0"/>
-              <a:t> </a:t>
-            </a:r>
-            <a:r>
-              <a:rPr lang="en-US" dirty="0"/>
-              <a:t>)</a:t>
-            </a:r>
-            <a:r>
-              <a:rPr lang="hr-HR" dirty="0"/>
-              <a:t> ... poziva </a:t>
-            </a:r>
-            <a:r>
-              <a:rPr lang="hr-HR" dirty="0">
-                <a:solidFill>
-                  <a:srgbClr val="FFC000"/>
-                </a:solidFill>
-              </a:rPr>
-              <a:t>Setup</a:t>
-            </a:r>
-            <a:r>
-              <a:rPr lang="hr-HR" dirty="0"/>
-              <a:t>()</a:t>
-            </a:r>
-          </a:p>
-          <a:p>
-            <a:pPr lvl="1"/>
-            <a:r>
-              <a:rPr lang="en-US" dirty="0"/>
-              <a:t>void </a:t>
-            </a:r>
-            <a:r>
-              <a:rPr lang="en-US" dirty="0" err="1">
-                <a:solidFill>
-                  <a:srgbClr val="FFC000"/>
-                </a:solidFill>
-              </a:rPr>
-              <a:t>GameForm_KeyDown</a:t>
-            </a:r>
-            <a:r>
-              <a:rPr lang="en-US" dirty="0"/>
-              <a:t>(object sender, </a:t>
-            </a:r>
-            <a:r>
-              <a:rPr lang="en-US" dirty="0" err="1"/>
-              <a:t>KeyEventArgs</a:t>
-            </a:r>
-            <a:r>
-              <a:rPr lang="en-US" dirty="0"/>
-              <a:t> e)</a:t>
-            </a:r>
-            <a:r>
-              <a:rPr lang="hr-HR" dirty="0"/>
-              <a:t> </a:t>
-            </a:r>
-          </a:p>
-          <a:p>
-            <a:pPr marL="457200" lvl="1" indent="0">
-              <a:buNone/>
-            </a:pPr>
-            <a:r>
-              <a:rPr lang="hr-HR" dirty="0"/>
-              <a:t>	... poziva </a:t>
-            </a:r>
-            <a:r>
-              <a:rPr lang="hr-HR" noProof="1">
-                <a:solidFill>
-                  <a:srgbClr val="FFC000"/>
-                </a:solidFill>
-              </a:rPr>
-              <a:t>KeyDown</a:t>
-            </a:r>
-            <a:r>
-              <a:rPr lang="hr-HR" dirty="0"/>
-              <a:t>()</a:t>
-            </a:r>
+              <a:t>KeyPressed</a:t>
+            </a:r>
+            <a:r>
+              <a:rPr lang="hr-HR" dirty="0"/>
+              <a:t>() ... shema igrica, poziv pritiskom na tipku</a:t>
+            </a:r>
+          </a:p>
+          <a:p>
             <a:endParaRPr lang="en-US" dirty="0"/>
           </a:p>
         </p:txBody>
@@ -5157,7 +6123,7 @@
     </p:spTree>
     <p:extLst>
       <p:ext uri="{BB962C8B-B14F-4D97-AF65-F5344CB8AC3E}">
-        <p14:creationId xmlns:p14="http://schemas.microsoft.com/office/powerpoint/2010/main" val="3159439359"/>
+        <p14:creationId xmlns:p14="http://schemas.microsoft.com/office/powerpoint/2010/main" val="2247568368"/>
       </p:ext>
     </p:extLst>
   </p:cSld>
@@ -5189,7 +6155,7 @@
           <p:cNvPr id="2" name="Title 1">
             <a:extLst>
               <a:ext uri="{FF2B5EF4-FFF2-40B4-BE49-F238E27FC236}">
-                <a16:creationId xmlns:a16="http://schemas.microsoft.com/office/drawing/2014/main" id="{2F9A3067-A73C-B706-5A15-577B7589345A}"/>
+                <a16:creationId xmlns:a16="http://schemas.microsoft.com/office/drawing/2014/main" id="{72DAB73D-586A-3DD7-6754-6C0E5A0B437C}"/>
               </a:ext>
             </a:extLst>
           </p:cNvPr>
@@ -5207,7 +6173,7 @@
           <a:p>
             <a:r>
               <a:rPr lang="hr-HR" dirty="0"/>
-              <a:t>GameForm.InitializeScreen</a:t>
+              <a:t>class GameForm : Form</a:t>
             </a:r>
             <a:endParaRPr lang="en-US" dirty="0"/>
           </a:p>
@@ -5218,7 +6184,7 @@
           <p:cNvPr id="3" name="Content Placeholder 2">
             <a:extLst>
               <a:ext uri="{FF2B5EF4-FFF2-40B4-BE49-F238E27FC236}">
-                <a16:creationId xmlns:a16="http://schemas.microsoft.com/office/drawing/2014/main" id="{59093DC0-399F-BAE4-C26D-669D059C09B6}"/>
+                <a16:creationId xmlns:a16="http://schemas.microsoft.com/office/drawing/2014/main" id="{47A4A945-B0C9-EB6E-E9B1-1702BC68F4AD}"/>
               </a:ext>
             </a:extLst>
           </p:cNvPr>
@@ -5234,30 +6200,305 @@
           <a:bodyPr/>
           <a:lstStyle/>
           <a:p>
-            <a:r>
-              <a:rPr lang="hr-HR" dirty="0"/>
-              <a:t>argument : </a:t>
+            <a:pPr lvl="1"/>
+            <a:r>
+              <a:rPr lang="hr-HR" dirty="0"/>
+              <a:t>void </a:t>
             </a:r>
             <a:r>
               <a:rPr lang="hr-HR" dirty="0">
                 <a:solidFill>
-                  <a:srgbClr val="00B0F0"/>
+                  <a:srgbClr val="FFC000"/>
                 </a:solidFill>
               </a:rPr>
-              <a:t>width</a:t>
-            </a:r>
-            <a:endParaRPr lang="en-US" dirty="0">
-              <a:solidFill>
-                <a:srgbClr val="00B0F0"/>
-              </a:solidFill>
-            </a:endParaRPr>
+              <a:t>InitializeScreen</a:t>
+            </a:r>
+            <a:r>
+              <a:rPr lang="hr-HR" dirty="0"/>
+              <a:t>( int width ) ... </a:t>
+            </a:r>
+            <a:r>
+              <a:rPr lang="hr-HR" dirty="0">
+                <a:solidFill>
+                  <a:schemeClr val="bg1">
+                    <a:lumMod val="50000"/>
+                  </a:schemeClr>
+                </a:solidFill>
+              </a:rPr>
+              <a:t>(na prezentaciji)</a:t>
+            </a:r>
+          </a:p>
+          <a:p>
+            <a:pPr lvl="1"/>
+            <a:r>
+              <a:rPr lang="hr-HR" dirty="0"/>
+              <a:t>void </a:t>
+            </a:r>
+            <a:r>
+              <a:rPr lang="hr-HR" dirty="0">
+                <a:solidFill>
+                  <a:srgbClr val="FFC000"/>
+                </a:solidFill>
+              </a:rPr>
+              <a:t>GetScreen</a:t>
+            </a:r>
+            <a:r>
+              <a:rPr lang="hr-HR" dirty="0"/>
+              <a:t>( int width ) ... </a:t>
+            </a:r>
+            <a:r>
+              <a:rPr lang="hr-HR" dirty="0">
+                <a:solidFill>
+                  <a:schemeClr val="bg1">
+                    <a:lumMod val="50000"/>
+                  </a:schemeClr>
+                </a:solidFill>
+              </a:rPr>
+              <a:t>(na prezentaciji)</a:t>
+            </a:r>
+          </a:p>
+          <a:p>
+            <a:pPr lvl="1"/>
+            <a:r>
+              <a:rPr lang="hr-HR" dirty="0"/>
+              <a:t>void </a:t>
+            </a:r>
+            <a:r>
+              <a:rPr lang="hr-HR" dirty="0">
+                <a:solidFill>
+                  <a:srgbClr val="FFC000"/>
+                </a:solidFill>
+              </a:rPr>
+              <a:t>ClearScreen</a:t>
+            </a:r>
+            <a:r>
+              <a:rPr lang="hr-HR" dirty="0"/>
+              <a:t>() ... postavlja pozadinu na crnu, shema igrica</a:t>
+            </a:r>
+          </a:p>
+          <a:p>
+            <a:pPr lvl="1"/>
+            <a:r>
+              <a:rPr lang="hr-HR" dirty="0"/>
+              <a:t>void </a:t>
+            </a:r>
+            <a:r>
+              <a:rPr lang="hr-HR" dirty="0">
+                <a:solidFill>
+                  <a:srgbClr val="FFC000"/>
+                </a:solidFill>
+              </a:rPr>
+              <a:t>DrawList</a:t>
+            </a:r>
+            <a:r>
+              <a:rPr lang="hr-HR" dirty="0"/>
+              <a:t>( </a:t>
+            </a:r>
+            <a:r>
+              <a:rPr lang="en-US" dirty="0"/>
+              <a:t>List&lt;Point&gt; pts, Color </a:t>
+            </a:r>
+            <a:r>
+              <a:rPr lang="en-US" noProof="1"/>
+              <a:t>color</a:t>
+            </a:r>
+            <a:r>
+              <a:rPr lang="hr-HR" dirty="0"/>
+              <a:t> ) ... crta kvadratiće iz pts u boji</a:t>
+            </a:r>
+          </a:p>
+          <a:p>
+            <a:pPr lvl="1"/>
+            <a:endParaRPr lang="hr-HR" dirty="0"/>
+          </a:p>
+          <a:p>
+            <a:pPr lvl="1"/>
+            <a:r>
+              <a:rPr lang="hr-HR" dirty="0">
+                <a:solidFill>
+                  <a:srgbClr val="FFC000"/>
+                </a:solidFill>
+              </a:rPr>
+              <a:t>GameForm</a:t>
+            </a:r>
+            <a:r>
+              <a:rPr lang="hr-HR" dirty="0"/>
+              <a:t>() ... tajmer pokreće</a:t>
+            </a:r>
+          </a:p>
+          <a:p>
+            <a:pPr lvl="1"/>
+            <a:r>
+              <a:rPr lang="hr-HR" dirty="0"/>
+              <a:t>void </a:t>
+            </a:r>
+            <a:r>
+              <a:rPr lang="hr-HR" dirty="0">
+                <a:solidFill>
+                  <a:srgbClr val="FFC000"/>
+                </a:solidFill>
+              </a:rPr>
+              <a:t>Timer1_Tick</a:t>
+            </a:r>
+            <a:r>
+              <a:rPr lang="hr-HR" dirty="0"/>
+              <a:t>( object sender, EventArgs e ) ... poziva </a:t>
+            </a:r>
+            <a:r>
+              <a:rPr lang="en-US" dirty="0" err="1">
+                <a:solidFill>
+                  <a:srgbClr val="FFC000"/>
+                </a:solidFill>
+              </a:rPr>
+              <a:t>Game.D</a:t>
+            </a:r>
+            <a:r>
+              <a:rPr lang="hr-HR" dirty="0">
+                <a:solidFill>
+                  <a:srgbClr val="FFC000"/>
+                </a:solidFill>
+              </a:rPr>
+              <a:t>raw</a:t>
+            </a:r>
+            <a:r>
+              <a:rPr lang="hr-HR" dirty="0"/>
+              <a:t>()</a:t>
+            </a:r>
+          </a:p>
+          <a:p>
+            <a:pPr lvl="1"/>
+            <a:r>
+              <a:rPr lang="en-US" dirty="0"/>
+              <a:t>void </a:t>
+            </a:r>
+            <a:r>
+              <a:rPr lang="en-US" dirty="0">
+                <a:solidFill>
+                  <a:srgbClr val="FFC000"/>
+                </a:solidFill>
+              </a:rPr>
+              <a:t>Form2_Load</a:t>
+            </a:r>
+            <a:r>
+              <a:rPr lang="en-US" dirty="0"/>
+              <a:t>(</a:t>
+            </a:r>
+            <a:r>
+              <a:rPr lang="hr-HR" dirty="0"/>
+              <a:t> </a:t>
+            </a:r>
+            <a:r>
+              <a:rPr lang="en-US" dirty="0"/>
+              <a:t>object sender, </a:t>
+            </a:r>
+            <a:r>
+              <a:rPr lang="en-US" noProof="1"/>
+              <a:t>EventArgs</a:t>
+            </a:r>
+            <a:r>
+              <a:rPr lang="en-US" dirty="0"/>
+              <a:t> e</a:t>
+            </a:r>
+            <a:r>
+              <a:rPr lang="hr-HR" dirty="0"/>
+              <a:t> </a:t>
+            </a:r>
+            <a:r>
+              <a:rPr lang="en-US" dirty="0"/>
+              <a:t>)</a:t>
+            </a:r>
+            <a:r>
+              <a:rPr lang="hr-HR" dirty="0"/>
+              <a:t> ... poziva </a:t>
+            </a:r>
+            <a:r>
+              <a:rPr lang="en-US" dirty="0" err="1">
+                <a:solidFill>
+                  <a:srgbClr val="FFC000"/>
+                </a:solidFill>
+              </a:rPr>
+              <a:t>Game.S</a:t>
+            </a:r>
+            <a:r>
+              <a:rPr lang="hr-HR" dirty="0">
+                <a:solidFill>
+                  <a:srgbClr val="FFC000"/>
+                </a:solidFill>
+              </a:rPr>
+              <a:t>etup</a:t>
+            </a:r>
+            <a:r>
+              <a:rPr lang="hr-HR" dirty="0"/>
+              <a:t>()</a:t>
+            </a:r>
+          </a:p>
+          <a:p>
+            <a:pPr lvl="1"/>
+            <a:r>
+              <a:rPr lang="en-US" dirty="0"/>
+              <a:t>void </a:t>
+            </a:r>
+            <a:r>
+              <a:rPr lang="en-US" dirty="0" err="1">
+                <a:solidFill>
+                  <a:srgbClr val="FFC000"/>
+                </a:solidFill>
+              </a:rPr>
+              <a:t>GameForm_KeyDown</a:t>
+            </a:r>
+            <a:r>
+              <a:rPr lang="en-US" dirty="0"/>
+              <a:t>(object sender, </a:t>
+            </a:r>
+            <a:r>
+              <a:rPr lang="en-US" dirty="0" err="1"/>
+              <a:t>KeyEventArgs</a:t>
+            </a:r>
+            <a:r>
+              <a:rPr lang="en-US" dirty="0"/>
+              <a:t> e)</a:t>
+            </a:r>
+            <a:r>
+              <a:rPr lang="hr-HR" dirty="0"/>
+              <a:t> </a:t>
+            </a:r>
+          </a:p>
+          <a:p>
+            <a:pPr marL="457200" lvl="1" indent="0">
+              <a:buNone/>
+            </a:pPr>
+            <a:r>
+              <a:rPr lang="hr-HR" dirty="0"/>
+              <a:t>	... poziva </a:t>
+            </a:r>
+            <a:r>
+              <a:rPr lang="en-US" noProof="1">
+                <a:solidFill>
+                  <a:srgbClr val="FFC000"/>
+                </a:solidFill>
+              </a:rPr>
+              <a:t>Game.K</a:t>
+            </a:r>
+            <a:r>
+              <a:rPr lang="hr-HR" noProof="1">
+                <a:solidFill>
+                  <a:srgbClr val="FFC000"/>
+                </a:solidFill>
+              </a:rPr>
+              <a:t>eyDown</a:t>
+            </a:r>
+            <a:r>
+              <a:rPr lang="hr-HR" dirty="0"/>
+              <a:t>()</a:t>
+            </a:r>
+            <a:endParaRPr lang="en-US" dirty="0"/>
           </a:p>
         </p:txBody>
       </p:sp>
     </p:spTree>
     <p:extLst>
       <p:ext uri="{BB962C8B-B14F-4D97-AF65-F5344CB8AC3E}">
-        <p14:creationId xmlns:p14="http://schemas.microsoft.com/office/powerpoint/2010/main" val="1609527602"/>
+        <p14:creationId xmlns:p14="http://schemas.microsoft.com/office/powerpoint/2010/main" val="3159439359"/>
       </p:ext>
     </p:extLst>
   </p:cSld>

</xml_diff>